<commit_message>
Improved formatting for "7. Classes and Objects"
</commit_message>
<xml_diff>
--- a/Courses/Software-Sciences/Module-1-OOP-New/07-Classes-and-Objects/07-Classes-and-Objects.pptx
+++ b/Courses/Software-Sciences/Module-1-OOP-New/07-Classes-and-Objects/07-Classes-and-Objects.pptx
@@ -5,10 +5,10 @@
     <p:sldMasterId id="2147483675" r:id="rId1"/>
   </p:sldMasterIdLst>
   <p:notesMasterIdLst>
-    <p:notesMasterId r:id="rId41"/>
+    <p:notesMasterId r:id="rId40"/>
   </p:notesMasterIdLst>
   <p:handoutMasterIdLst>
-    <p:handoutMasterId r:id="rId42"/>
+    <p:handoutMasterId r:id="rId41"/>
   </p:handoutMasterIdLst>
   <p:sldIdLst>
     <p:sldId id="297" r:id="rId2"/>
@@ -34,22 +34,21 @@
     <p:sldId id="534" r:id="rId22"/>
     <p:sldId id="535" r:id="rId23"/>
     <p:sldId id="536" r:id="rId24"/>
-    <p:sldId id="537" r:id="rId25"/>
-    <p:sldId id="538" r:id="rId26"/>
-    <p:sldId id="539" r:id="rId27"/>
-    <p:sldId id="540" r:id="rId28"/>
-    <p:sldId id="541" r:id="rId29"/>
-    <p:sldId id="542" r:id="rId30"/>
-    <p:sldId id="543" r:id="rId31"/>
-    <p:sldId id="544" r:id="rId32"/>
-    <p:sldId id="545" r:id="rId33"/>
-    <p:sldId id="546" r:id="rId34"/>
-    <p:sldId id="547" r:id="rId35"/>
-    <p:sldId id="548" r:id="rId36"/>
-    <p:sldId id="549" r:id="rId37"/>
-    <p:sldId id="343" r:id="rId38"/>
-    <p:sldId id="401" r:id="rId39"/>
-    <p:sldId id="493" r:id="rId40"/>
+    <p:sldId id="538" r:id="rId25"/>
+    <p:sldId id="539" r:id="rId26"/>
+    <p:sldId id="540" r:id="rId27"/>
+    <p:sldId id="541" r:id="rId28"/>
+    <p:sldId id="542" r:id="rId29"/>
+    <p:sldId id="543" r:id="rId30"/>
+    <p:sldId id="544" r:id="rId31"/>
+    <p:sldId id="545" r:id="rId32"/>
+    <p:sldId id="546" r:id="rId33"/>
+    <p:sldId id="547" r:id="rId34"/>
+    <p:sldId id="548" r:id="rId35"/>
+    <p:sldId id="549" r:id="rId36"/>
+    <p:sldId id="343" r:id="rId37"/>
+    <p:sldId id="401" r:id="rId38"/>
+    <p:sldId id="493" r:id="rId39"/>
   </p:sldIdLst>
   <p:sldSz cx="12192000" cy="6858000"/>
   <p:notesSz cx="6858000" cy="9144000"/>
@@ -151,7 +150,7 @@
   <p:extLst>
     <p:ext uri="{521415D9-36F7-43E2-AB2F-B90AF26B5E84}">
       <p14:sectionLst xmlns:p14="http://schemas.microsoft.com/office/powerpoint/2010/main">
-        <p14:section name="Intro" id="{E700BDB4-EB25-4458-9C38-D57E5CC4D9AF}">
+        <p14:section name="Въведение" id="{E700BDB4-EB25-4458-9C38-D57E5CC4D9AF}">
           <p14:sldIdLst>
             <p14:sldId id="297"/>
             <p14:sldId id="298"/>
@@ -188,7 +187,6 @@
             <p14:sldId id="534"/>
             <p14:sldId id="535"/>
             <p14:sldId id="536"/>
-            <p14:sldId id="537"/>
           </p14:sldIdLst>
         </p14:section>
         <p14:section name="Методи" id="{524E629E-3CB4-4E51-BBFC-4CFD86818547}">
@@ -211,7 +209,7 @@
             <p14:sldId id="549"/>
           </p14:sldIdLst>
         </p14:section>
-        <p14:section name="Conclusion" id="{DD02C24B-513C-4CFA-9E95-574B842AE999}">
+        <p14:section name="Обобщение" id="{DD02C24B-513C-4CFA-9E95-574B842AE999}">
           <p14:sldIdLst>
             <p14:sldId id="343"/>
             <p14:sldId id="401"/>
@@ -335,7 +333,7 @@
           <a:p>
             <a:fld id="{4E087215-0C8F-4762-A664-737A353EC9A4}" type="datetimeFigureOut">
               <a:rPr lang="bg-BG" smtClean="0"/>
-              <a:t>8.12.22 г.</a:t>
+              <a:t>17.12.22 г.</a:t>
             </a:fld>
             <a:endParaRPr lang="bg-BG"/>
           </a:p>
@@ -526,7 +524,7 @@
           <a:p>
             <a:fld id="{72D84649-876A-46C9-8472-14CB09C070D8}" type="datetimeFigureOut">
               <a:rPr lang="en-US" smtClean="0"/>
-              <a:t>12/8/22</a:t>
+              <a:t>12/17/22</a:t>
             </a:fld>
             <a:endParaRPr lang="en-US"/>
           </a:p>
@@ -1014,7 +1012,7 @@
             <a:fld id="{3EBA5BD7-F043-4D1B-AA17-CD412FC534DE}" type="slidenum">
               <a:rPr lang="en-US" smtClean="0"/>
               <a:pPr/>
-              <a:t>25</a:t>
+              <a:t>24</a:t>
             </a:fld>
             <a:endParaRPr lang="en-US" dirty="0"/>
           </a:p>
@@ -1148,7 +1146,7 @@
           <a:p>
             <a:fld id="{2BF067CD-8E6B-4360-9AA8-C5DF2A48A6D1}" type="slidenum">
               <a:rPr lang="en-US" smtClean="0"/>
-              <a:t>27</a:t>
+              <a:t>26</a:t>
             </a:fld>
             <a:endParaRPr lang="en-US" dirty="0"/>
           </a:p>
@@ -1283,7 +1281,7 @@
             <a:fld id="{3EBA5BD7-F043-4D1B-AA17-CD412FC534DE}" type="slidenum">
               <a:rPr lang="en-US" smtClean="0"/>
               <a:pPr/>
-              <a:t>31</a:t>
+              <a:t>30</a:t>
             </a:fld>
             <a:endParaRPr lang="en-US" dirty="0"/>
           </a:p>
@@ -1418,7 +1416,7 @@
             <a:fld id="{3EBA5BD7-F043-4D1B-AA17-CD412FC534DE}" type="slidenum">
               <a:rPr lang="en-US" smtClean="0"/>
               <a:pPr/>
-              <a:t>32</a:t>
+              <a:t>31</a:t>
             </a:fld>
             <a:endParaRPr lang="en-US" dirty="0"/>
           </a:p>
@@ -1553,7 +1551,7 @@
             <a:fld id="{3EBA5BD7-F043-4D1B-AA17-CD412FC534DE}" type="slidenum">
               <a:rPr lang="en-US" smtClean="0"/>
               <a:pPr/>
-              <a:t>33</a:t>
+              <a:t>32</a:t>
             </a:fld>
             <a:endParaRPr lang="en-US" dirty="0"/>
           </a:p>
@@ -1688,7 +1686,7 @@
             <a:fld id="{3EBA5BD7-F043-4D1B-AA17-CD412FC534DE}" type="slidenum">
               <a:rPr lang="en-US" smtClean="0"/>
               <a:pPr/>
-              <a:t>35</a:t>
+              <a:t>34</a:t>
             </a:fld>
             <a:endParaRPr lang="en-US" dirty="0"/>
           </a:p>
@@ -1823,7 +1821,7 @@
             <a:fld id="{3EBA5BD7-F043-4D1B-AA17-CD412FC534DE}" type="slidenum">
               <a:rPr lang="en-US" smtClean="0"/>
               <a:pPr/>
-              <a:t>36</a:t>
+              <a:t>35</a:t>
             </a:fld>
             <a:endParaRPr lang="en-US" dirty="0"/>
           </a:p>
@@ -1958,7 +1956,7 @@
             <a:fld id="{3EBA5BD7-F043-4D1B-AA17-CD412FC534DE}" type="slidenum">
               <a:rPr lang="en-US" smtClean="0"/>
               <a:pPr/>
-              <a:t>37</a:t>
+              <a:t>36</a:t>
             </a:fld>
             <a:endParaRPr lang="en-US" dirty="0"/>
           </a:p>
@@ -2199,7 +2197,7 @@
             <a:fld id="{3EBA5BD7-F043-4D1B-AA17-CD412FC534DE}" type="slidenum">
               <a:rPr lang="en-US" smtClean="0"/>
               <a:pPr/>
-              <a:t>38</a:t>
+              <a:t>37</a:t>
             </a:fld>
             <a:endParaRPr lang="en-US" dirty="0"/>
           </a:p>
@@ -2440,7 +2438,7 @@
             <a:fld id="{3EBA5BD7-F043-4D1B-AA17-CD412FC534DE}" type="slidenum">
               <a:rPr lang="en-US" smtClean="0"/>
               <a:pPr/>
-              <a:t>39</a:t>
+              <a:t>38</a:t>
             </a:fld>
             <a:endParaRPr lang="en-US" dirty="0"/>
           </a:p>
@@ -10999,7 +10997,7 @@
         </p:nvSpPr>
         <p:spPr>
           <a:xfrm>
-            <a:off x="2271997" y="1248063"/>
+            <a:off x="2232713" y="1123354"/>
             <a:ext cx="9520317" cy="5274674"/>
           </a:xfrm>
         </p:spPr>
@@ -12836,7 +12834,7 @@
                   <a:schemeClr val="bg1"/>
                 </a:solidFill>
               </a:rPr>
-              <a:t>PascalCasing</a:t>
+              <a:t>PascalCase</a:t>
             </a:r>
           </a:p>
           <a:p>
@@ -15509,9 +15507,9 @@
         <p:grpSpPr>
           <a:xfrm>
             <a:off x="839750" y="2098190"/>
-            <a:ext cx="10512503" cy="4007179"/>
+            <a:ext cx="10512503" cy="3490340"/>
             <a:chOff x="838380" y="1952550"/>
-            <a:chExt cx="10515241" cy="4008223"/>
+            <a:chExt cx="10515241" cy="3491249"/>
           </a:xfrm>
         </p:grpSpPr>
         <p:sp>
@@ -15709,7 +15707,7 @@
           <p:spPr>
             <a:xfrm>
               <a:off x="838380" y="2664000"/>
-              <a:ext cx="10515241" cy="3296773"/>
+              <a:ext cx="10515241" cy="2779799"/>
             </a:xfrm>
             <a:prstGeom prst="rect">
               <a:avLst/>
@@ -15938,27 +15936,6 @@
                   </a:solidFill>
                 </a:rPr>
                 <a:t>  public int Height { get; set; }</a:t>
-              </a:r>
-            </a:p>
-            <a:p>
-              <a:pPr>
-                <a:lnSpc>
-                  <a:spcPct val="105000"/>
-                </a:lnSpc>
-                <a:spcBef>
-                  <a:spcPts val="0"/>
-                </a:spcBef>
-                <a:spcAft>
-                  <a:spcPts val="0"/>
-                </a:spcAft>
-              </a:pPr>
-              <a:r>
-                <a:rPr lang="en-US" sz="3199" noProof="1">
-                  <a:solidFill>
-                    <a:schemeClr val="tx1"/>
-                  </a:solidFill>
-                </a:rPr>
-                <a:t>  public string Color { get; set; }</a:t>
               </a:r>
             </a:p>
             <a:p>
@@ -21016,8 +20993,16 @@
               <a:t> </a:t>
             </a:r>
             <a:r>
+              <a:rPr lang="bg-BG" sz="3000" b="1" dirty="0">
+                <a:solidFill>
+                  <a:schemeClr val="bg1"/>
+                </a:solidFill>
+              </a:rPr>
+              <a:t>обекти</a:t>
+            </a:r>
+            <a:r>
               <a:rPr lang="bg-BG" sz="3000" dirty="0"/>
-              <a:t>обекти за моделиране на примери от реалния живот</a:t>
+              <a:t> за моделиране на примери от реалния живот</a:t>
             </a:r>
             <a:endParaRPr lang="en-US" sz="3000" dirty="0"/>
           </a:p>
@@ -21626,13 +21611,13 @@
         </p:nvSpPr>
         <p:spPr bwMode="auto">
           <a:xfrm>
-            <a:off x="4164631" y="2245964"/>
+            <a:off x="4121918" y="2204854"/>
             <a:ext cx="2951067" cy="1055298"/>
           </a:xfrm>
           <a:prstGeom prst="wedgeRoundRectCallout">
             <a:avLst>
-              <a:gd name="adj1" fmla="val -66560"/>
-              <a:gd name="adj2" fmla="val 42740"/>
+              <a:gd name="adj1" fmla="val -70864"/>
+              <a:gd name="adj2" fmla="val 25892"/>
               <a:gd name="adj3" fmla="val 16667"/>
             </a:avLst>
           </a:prstGeom>
@@ -21792,13 +21777,13 @@
         </p:nvSpPr>
         <p:spPr bwMode="auto">
           <a:xfrm>
-            <a:off x="5396497" y="4579027"/>
+            <a:off x="5331000" y="4604546"/>
             <a:ext cx="1912591" cy="578713"/>
           </a:xfrm>
           <a:prstGeom prst="wedgeRoundRectCallout">
             <a:avLst>
-              <a:gd name="adj1" fmla="val -71170"/>
-              <a:gd name="adj2" fmla="val -55451"/>
+              <a:gd name="adj1" fmla="val -52577"/>
+              <a:gd name="adj2" fmla="val -109582"/>
               <a:gd name="adj3" fmla="val 16667"/>
             </a:avLst>
           </a:prstGeom>
@@ -21880,8 +21865,8 @@
           </a:xfrm>
           <a:prstGeom prst="wedgeRoundRectCallout">
             <a:avLst>
-              <a:gd name="adj1" fmla="val -84823"/>
-              <a:gd name="adj2" fmla="val -50176"/>
+              <a:gd name="adj1" fmla="val -85304"/>
+              <a:gd name="adj2" fmla="val -75047"/>
               <a:gd name="adj3" fmla="val 16667"/>
             </a:avLst>
           </a:prstGeom>
@@ -25510,8 +25495,8 @@
           </a:xfrm>
           <a:prstGeom prst="wedgeRoundRectCallout">
             <a:avLst>
-              <a:gd name="adj1" fmla="val -79639"/>
-              <a:gd name="adj2" fmla="val -71675"/>
+              <a:gd name="adj1" fmla="val -71126"/>
+              <a:gd name="adj2" fmla="val -76281"/>
               <a:gd name="adj3" fmla="val 16667"/>
             </a:avLst>
           </a:prstGeom>
@@ -25913,7 +25898,15 @@
                   <a:schemeClr val="bg1"/>
                 </a:solidFill>
               </a:rPr>
-              <a:t>accessors</a:t>
+              <a:t>accessor</a:t>
+            </a:r>
+            <a:r>
+              <a:rPr lang="bg-BG" sz="3600" b="1" dirty="0">
+                <a:solidFill>
+                  <a:schemeClr val="bg1"/>
+                </a:solidFill>
+              </a:rPr>
+              <a:t>-и</a:t>
             </a:r>
             <a:r>
               <a:rPr lang="en-US" sz="3600" dirty="0"/>
@@ -25933,7 +25926,15 @@
                   <a:schemeClr val="bg1"/>
                 </a:solidFill>
               </a:rPr>
-              <a:t>mutators</a:t>
+              <a:t>mutator</a:t>
+            </a:r>
+            <a:r>
+              <a:rPr lang="bg-BG" sz="3600" b="1" dirty="0">
+                <a:solidFill>
+                  <a:schemeClr val="bg1"/>
+                </a:solidFill>
+              </a:rPr>
+              <a:t>-и</a:t>
             </a:r>
             <a:r>
               <a:rPr lang="en-US" sz="3600" dirty="0"/>
@@ -26500,8 +26501,8 @@
         </p:nvSpPr>
         <p:spPr>
           <a:xfrm>
-            <a:off x="4681886" y="2185047"/>
-            <a:ext cx="7267405" cy="3689574"/>
+            <a:off x="4669332" y="1952011"/>
+            <a:ext cx="7267405" cy="4076994"/>
           </a:xfrm>
           <a:prstGeom prst="rect">
             <a:avLst/>
@@ -26837,13 +26838,50 @@
               <a:t>// TODO: </a:t>
             </a:r>
             <a:r>
+              <a:rPr lang="bg-BG" sz="2399" i="1" dirty="0">
+                <a:solidFill>
+                  <a:schemeClr val="accent2"/>
+                </a:solidFill>
+              </a:rPr>
+              <a:t>Добавете </a:t>
+            </a:r>
+            <a:r>
               <a:rPr lang="en-GB" sz="2399" i="1" dirty="0">
                 <a:solidFill>
                   <a:schemeClr val="accent2"/>
                 </a:solidFill>
               </a:rPr>
-              <a:t>Balance and Year Getter &amp; Setter</a:t>
-            </a:r>
+              <a:t>Getter </a:t>
+            </a:r>
+            <a:r>
+              <a:rPr lang="bg-BG" sz="2399" i="1" dirty="0">
+                <a:solidFill>
+                  <a:schemeClr val="accent2"/>
+                </a:solidFill>
+              </a:rPr>
+              <a:t>и</a:t>
+            </a:r>
+            <a:r>
+              <a:rPr lang="en-GB" sz="2399" i="1" dirty="0">
+                <a:solidFill>
+                  <a:schemeClr val="accent2"/>
+                </a:solidFill>
+              </a:rPr>
+              <a:t> Setter</a:t>
+            </a:r>
+            <a:r>
+              <a:rPr lang="bg-BG" sz="2399" i="1" dirty="0">
+                <a:solidFill>
+                  <a:schemeClr val="accent2"/>
+                </a:solidFill>
+              </a:rPr>
+              <a:t> за модела и годината</a:t>
+            </a:r>
+            <a:endParaRPr lang="en-GB" sz="2399" i="1" dirty="0">
+              <a:solidFill>
+                <a:schemeClr val="accent2"/>
+              </a:solidFill>
+            </a:endParaRPr>
           </a:p>
         </p:txBody>
       </p:sp>
@@ -27784,715 +27822,6 @@
           <p:cNvPr id="5" name="Title 4">
             <a:extLst>
               <a:ext uri="{FF2B5EF4-FFF2-40B4-BE49-F238E27FC236}">
-                <a16:creationId xmlns:a16="http://schemas.microsoft.com/office/drawing/2014/main" id="{7331FF1A-FF1B-4C69-8AC5-9153DF18B914}"/>
-              </a:ext>
-            </a:extLst>
-          </p:cNvPr>
-          <p:cNvSpPr>
-            <a:spLocks noGrp="1"/>
-          </p:cNvSpPr>
-          <p:nvPr>
-            <p:ph type="title"/>
-          </p:nvPr>
-        </p:nvSpPr>
-        <p:spPr/>
-        <p:txBody>
-          <a:bodyPr/>
-          <a:lstStyle/>
-          <a:p>
-            <a:r>
-              <a:rPr lang="bg-BG" dirty="0"/>
-              <a:t>Кратки свойства в </a:t>
-            </a:r>
-            <a:r>
-              <a:rPr lang="en-US" dirty="0"/>
-              <a:t>C#</a:t>
-            </a:r>
-          </a:p>
-        </p:txBody>
-      </p:sp>
-      <p:sp>
-        <p:nvSpPr>
-          <p:cNvPr id="7" name="Text Placeholder 5">
-            <a:extLst>
-              <a:ext uri="{FF2B5EF4-FFF2-40B4-BE49-F238E27FC236}">
-                <a16:creationId xmlns:a16="http://schemas.microsoft.com/office/drawing/2014/main" id="{A37944F8-BBBD-456E-9A9A-2A46F712D36A}"/>
-              </a:ext>
-            </a:extLst>
-          </p:cNvPr>
-          <p:cNvSpPr txBox="1">
-            <a:spLocks/>
-          </p:cNvSpPr>
-          <p:nvPr/>
-        </p:nvSpPr>
-        <p:spPr>
-          <a:xfrm>
-            <a:off x="1689830" y="1862623"/>
-            <a:ext cx="8812342" cy="3815793"/>
-          </a:xfrm>
-          <a:prstGeom prst="rect">
-            <a:avLst/>
-          </a:prstGeom>
-          <a:solidFill>
-            <a:schemeClr val="accent6">
-              <a:lumMod val="75000"/>
-              <a:alpha val="15000"/>
-            </a:schemeClr>
-          </a:solidFill>
-          <a:ln w="12700">
-            <a:solidFill>
-              <a:schemeClr val="tx1">
-                <a:lumMod val="50000"/>
-              </a:schemeClr>
-            </a:solidFill>
-          </a:ln>
-        </p:spPr>
-        <p:txBody>
-          <a:bodyPr vert="horz" wrap="square" lIns="143963" tIns="107972" rIns="143963" bIns="107972" rtlCol="0">
-            <a:spAutoFit/>
-          </a:bodyPr>
-          <a:lstStyle>
-            <a:defPPr>
-              <a:defRPr lang="en-US"/>
-            </a:defPPr>
-            <a:lvl1pPr indent="0" defTabSz="1218438" latinLnBrk="1">
-              <a:lnSpc>
-                <a:spcPct val="100000"/>
-              </a:lnSpc>
-              <a:spcBef>
-                <a:spcPts val="600"/>
-              </a:spcBef>
-              <a:spcAft>
-                <a:spcPts val="600"/>
-              </a:spcAft>
-              <a:buFont typeface="Wingdings" panose="05000000000000000000" pitchFamily="2" charset="2"/>
-              <a:buNone/>
-              <a:defRPr sz="2200" b="1">
-                <a:solidFill>
-                  <a:schemeClr val="tx1">
-                    <a:lumMod val="75000"/>
-                  </a:schemeClr>
-                </a:solidFill>
-                <a:effectLst/>
-                <a:latin typeface="Consolas" pitchFamily="49" charset="0"/>
-                <a:cs typeface="Consolas" pitchFamily="49" charset="0"/>
-              </a:defRPr>
-            </a:lvl1pPr>
-            <a:lvl2pPr marL="989981" indent="-380762" defTabSz="1218438" latinLnBrk="1">
-              <a:lnSpc>
-                <a:spcPct val="105000"/>
-              </a:lnSpc>
-              <a:spcBef>
-                <a:spcPts val="600"/>
-              </a:spcBef>
-              <a:spcAft>
-                <a:spcPts val="600"/>
-              </a:spcAft>
-              <a:buFont typeface="Wingdings" panose="05000000000000000000" pitchFamily="2" charset="2"/>
-              <a:buChar char="§"/>
-              <a:defRPr sz="3198"/>
-            </a:lvl2pPr>
-            <a:lvl3pPr marL="1523048" indent="-304610" defTabSz="1218438" latinLnBrk="1">
-              <a:lnSpc>
-                <a:spcPct val="105000"/>
-              </a:lnSpc>
-              <a:spcBef>
-                <a:spcPts val="600"/>
-              </a:spcBef>
-              <a:spcAft>
-                <a:spcPts val="600"/>
-              </a:spcAft>
-              <a:buFont typeface="Wingdings" panose="05000000000000000000" pitchFamily="2" charset="2"/>
-              <a:buChar char="§"/>
-              <a:defRPr sz="2998"/>
-            </a:lvl3pPr>
-            <a:lvl4pPr marL="2132267" indent="-304610" defTabSz="1218438" latinLnBrk="1">
-              <a:lnSpc>
-                <a:spcPct val="105000"/>
-              </a:lnSpc>
-              <a:spcBef>
-                <a:spcPts val="600"/>
-              </a:spcBef>
-              <a:spcAft>
-                <a:spcPts val="600"/>
-              </a:spcAft>
-              <a:buFont typeface="Wingdings" panose="05000000000000000000" pitchFamily="2" charset="2"/>
-              <a:buChar char="§"/>
-              <a:defRPr sz="2798"/>
-            </a:lvl4pPr>
-            <a:lvl5pPr marL="2741485" indent="-304610" defTabSz="1218438" latinLnBrk="1">
-              <a:lnSpc>
-                <a:spcPct val="105000"/>
-              </a:lnSpc>
-              <a:spcBef>
-                <a:spcPts val="600"/>
-              </a:spcBef>
-              <a:spcAft>
-                <a:spcPts val="600"/>
-              </a:spcAft>
-              <a:buFont typeface="Wingdings" panose="05000000000000000000" pitchFamily="2" charset="2"/>
-              <a:buChar char="§"/>
-              <a:defRPr sz="2598"/>
-            </a:lvl5pPr>
-            <a:lvl6pPr marL="3350704" indent="-304610" defTabSz="1218438" latinLnBrk="1">
-              <a:spcBef>
-                <a:spcPct val="20000"/>
-              </a:spcBef>
-              <a:buFont typeface="Arial" pitchFamily="34" charset="0"/>
-              <a:buChar char="•"/>
-              <a:defRPr sz="2665"/>
-            </a:lvl6pPr>
-            <a:lvl7pPr marL="3959924" indent="-304610" defTabSz="1218438" latinLnBrk="1">
-              <a:spcBef>
-                <a:spcPct val="20000"/>
-              </a:spcBef>
-              <a:buFont typeface="Arial" pitchFamily="34" charset="0"/>
-              <a:buChar char="•"/>
-              <a:defRPr sz="2665"/>
-            </a:lvl7pPr>
-            <a:lvl8pPr marL="4569143" indent="-304610" defTabSz="1218438" latinLnBrk="1">
-              <a:spcBef>
-                <a:spcPct val="20000"/>
-              </a:spcBef>
-              <a:buFont typeface="Arial" pitchFamily="34" charset="0"/>
-              <a:buChar char="•"/>
-              <a:defRPr sz="2665"/>
-            </a:lvl8pPr>
-            <a:lvl9pPr marL="5178362" indent="-304610" defTabSz="1218438" latinLnBrk="1">
-              <a:spcBef>
-                <a:spcPct val="20000"/>
-              </a:spcBef>
-              <a:buFont typeface="Arial" pitchFamily="34" charset="0"/>
-              <a:buChar char="•"/>
-              <a:defRPr sz="2665"/>
-            </a:lvl9pPr>
-          </a:lstStyle>
-          <a:p>
-            <a:pPr>
-              <a:lnSpc>
-                <a:spcPct val="105000"/>
-              </a:lnSpc>
-              <a:spcBef>
-                <a:spcPts val="0"/>
-              </a:spcBef>
-              <a:spcAft>
-                <a:spcPts val="0"/>
-              </a:spcAft>
-            </a:pPr>
-            <a:r>
-              <a:rPr lang="en-GB" sz="2799" dirty="0">
-                <a:solidFill>
-                  <a:schemeClr val="tx1"/>
-                </a:solidFill>
-              </a:rPr>
-              <a:t>public string Brand { get; private set; }</a:t>
-            </a:r>
-          </a:p>
-          <a:p>
-            <a:pPr>
-              <a:lnSpc>
-                <a:spcPct val="105000"/>
-              </a:lnSpc>
-              <a:spcBef>
-                <a:spcPts val="0"/>
-              </a:spcBef>
-              <a:spcAft>
-                <a:spcPts val="0"/>
-              </a:spcAft>
-            </a:pPr>
-            <a:endParaRPr lang="en-GB" sz="2799" dirty="0">
-              <a:solidFill>
-                <a:schemeClr val="tx1"/>
-              </a:solidFill>
-            </a:endParaRPr>
-          </a:p>
-          <a:p>
-            <a:pPr>
-              <a:lnSpc>
-                <a:spcPct val="105000"/>
-              </a:lnSpc>
-              <a:spcBef>
-                <a:spcPts val="0"/>
-              </a:spcBef>
-              <a:spcAft>
-                <a:spcPts val="0"/>
-              </a:spcAft>
-            </a:pPr>
-            <a:r>
-              <a:rPr lang="en-GB" sz="2799" dirty="0">
-                <a:solidFill>
-                  <a:schemeClr val="tx1"/>
-                </a:solidFill>
-              </a:rPr>
-              <a:t>public string Make { get; set; }</a:t>
-            </a:r>
-          </a:p>
-          <a:p>
-            <a:pPr>
-              <a:lnSpc>
-                <a:spcPct val="105000"/>
-              </a:lnSpc>
-              <a:spcBef>
-                <a:spcPts val="0"/>
-              </a:spcBef>
-              <a:spcAft>
-                <a:spcPts val="0"/>
-              </a:spcAft>
-            </a:pPr>
-            <a:endParaRPr lang="en-GB" sz="2799" dirty="0">
-              <a:solidFill>
-                <a:schemeClr val="tx1"/>
-              </a:solidFill>
-            </a:endParaRPr>
-          </a:p>
-          <a:p>
-            <a:pPr>
-              <a:lnSpc>
-                <a:spcPct val="105000"/>
-              </a:lnSpc>
-              <a:spcBef>
-                <a:spcPts val="0"/>
-              </a:spcBef>
-              <a:spcAft>
-                <a:spcPts val="0"/>
-              </a:spcAft>
-            </a:pPr>
-            <a:r>
-              <a:rPr lang="en-GB" sz="2799" dirty="0">
-                <a:solidFill>
-                  <a:schemeClr val="tx1"/>
-                </a:solidFill>
-              </a:rPr>
-              <a:t>public string BrandAndMake </a:t>
-            </a:r>
-          </a:p>
-          <a:p>
-            <a:pPr>
-              <a:lnSpc>
-                <a:spcPct val="105000"/>
-              </a:lnSpc>
-              <a:spcBef>
-                <a:spcPts val="0"/>
-              </a:spcBef>
-              <a:spcAft>
-                <a:spcPts val="0"/>
-              </a:spcAft>
-            </a:pPr>
-            <a:r>
-              <a:rPr lang="en-GB" sz="2799" dirty="0">
-                <a:solidFill>
-                  <a:schemeClr val="tx1"/>
-                </a:solidFill>
-              </a:rPr>
-              <a:t>{</a:t>
-            </a:r>
-          </a:p>
-          <a:p>
-            <a:pPr>
-              <a:lnSpc>
-                <a:spcPct val="105000"/>
-              </a:lnSpc>
-              <a:spcBef>
-                <a:spcPts val="0"/>
-              </a:spcBef>
-              <a:spcAft>
-                <a:spcPts val="0"/>
-              </a:spcAft>
-            </a:pPr>
-            <a:r>
-              <a:rPr lang="en-GB" sz="2799" dirty="0">
-                <a:solidFill>
-                  <a:schemeClr val="tx1"/>
-                </a:solidFill>
-              </a:rPr>
-              <a:t>  get =&gt; Brand + " " + Make;</a:t>
-            </a:r>
-          </a:p>
-          <a:p>
-            <a:pPr>
-              <a:lnSpc>
-                <a:spcPct val="105000"/>
-              </a:lnSpc>
-              <a:spcBef>
-                <a:spcPts val="0"/>
-              </a:spcBef>
-              <a:spcAft>
-                <a:spcPts val="0"/>
-              </a:spcAft>
-            </a:pPr>
-            <a:r>
-              <a:rPr lang="en-GB" sz="2799" dirty="0">
-                <a:solidFill>
-                  <a:schemeClr val="tx1"/>
-                </a:solidFill>
-              </a:rPr>
-              <a:t>}</a:t>
-            </a:r>
-            <a:endParaRPr lang="en-GB" sz="2799" i="1" dirty="0">
-              <a:solidFill>
-                <a:schemeClr val="accent2"/>
-              </a:solidFill>
-            </a:endParaRPr>
-          </a:p>
-        </p:txBody>
-      </p:sp>
-      <p:sp>
-        <p:nvSpPr>
-          <p:cNvPr id="8" name="Slide Number">
-            <a:extLst>
-              <a:ext uri="{FF2B5EF4-FFF2-40B4-BE49-F238E27FC236}">
-                <a16:creationId xmlns:a16="http://schemas.microsoft.com/office/drawing/2014/main" id="{BECF2C9F-C568-4A00-B861-B268E1FAC76C}"/>
-              </a:ext>
-            </a:extLst>
-          </p:cNvPr>
-          <p:cNvSpPr>
-            <a:spLocks noGrp="1"/>
-          </p:cNvSpPr>
-          <p:nvPr>
-            <p:ph type="sldNum" sz="quarter" idx="5"/>
-          </p:nvPr>
-        </p:nvSpPr>
-        <p:spPr>
-          <a:xfrm>
-            <a:off x="11753030" y="6507000"/>
-            <a:ext cx="367414" cy="297000"/>
-          </a:xfrm>
-          <a:prstGeom prst="rect">
-            <a:avLst/>
-          </a:prstGeom>
-        </p:spPr>
-        <p:txBody>
-          <a:bodyPr vert="horz" lIns="91440" tIns="45720" rIns="91440" bIns="45720" rtlCol="0" anchor="b"/>
-          <a:lstStyle>
-            <a:lvl1pPr algn="r">
-              <a:defRPr sz="1000"/>
-            </a:lvl1pPr>
-          </a:lstStyle>
-          <a:p>
-            <a:fld id="{2BF067CD-8E6B-4360-9AA8-C5DF2A48A6D1}" type="slidenum">
-              <a:rPr lang="en-US" noProof="0" smtClean="0"/>
-              <a:pPr/>
-              <a:t>24</a:t>
-            </a:fld>
-            <a:endParaRPr lang="en-US" noProof="0" dirty="0"/>
-          </a:p>
-        </p:txBody>
-      </p:sp>
-    </p:spTree>
-    <p:extLst>
-      <p:ext uri="{BB962C8B-B14F-4D97-AF65-F5344CB8AC3E}">
-        <p14:creationId xmlns:p14="http://schemas.microsoft.com/office/powerpoint/2010/main" val="1750739420"/>
-      </p:ext>
-    </p:extLst>
-  </p:cSld>
-  <p:clrMapOvr>
-    <a:masterClrMapping/>
-  </p:clrMapOvr>
-  <mc:AlternateContent xmlns:mc="http://schemas.openxmlformats.org/markup-compatibility/2006" xmlns:p14="http://schemas.microsoft.com/office/powerpoint/2010/main">
-    <mc:Choice Requires="p14">
-      <p:transition spd="slow" p14:dur="2000" advClick="0" advTm="5000"/>
-    </mc:Choice>
-    <mc:Fallback xmlns="">
-      <p:transition spd="slow" advClick="0" advTm="5000"/>
-    </mc:Fallback>
-  </mc:AlternateContent>
-  <p:timing>
-    <p:tnLst>
-      <p:par>
-        <p:cTn id="1" dur="indefinite" restart="never" nodeType="tmRoot">
-          <p:childTnLst>
-            <p:seq concurrent="1" nextAc="seek">
-              <p:cTn id="2" dur="indefinite" nodeType="mainSeq">
-                <p:childTnLst>
-                  <p:par>
-                    <p:cTn id="3" fill="hold">
-                      <p:stCondLst>
-                        <p:cond delay="indefinite"/>
-                        <p:cond evt="onBegin" delay="0">
-                          <p:tn val="2"/>
-                        </p:cond>
-                      </p:stCondLst>
-                      <p:childTnLst>
-                        <p:par>
-                          <p:cTn id="4" fill="hold">
-                            <p:stCondLst>
-                              <p:cond delay="0"/>
-                            </p:stCondLst>
-                            <p:childTnLst>
-                              <p:par>
-                                <p:cTn id="5" presetID="1" presetClass="entr" presetSubtype="0" fill="hold" grpId="0" nodeType="withEffect">
-                                  <p:stCondLst>
-                                    <p:cond delay="0"/>
-                                  </p:stCondLst>
-                                  <p:childTnLst>
-                                    <p:set>
-                                      <p:cBhvr>
-                                        <p:cTn id="6" dur="1" fill="hold">
-                                          <p:stCondLst>
-                                            <p:cond delay="0"/>
-                                          </p:stCondLst>
-                                        </p:cTn>
-                                        <p:tgtEl>
-                                          <p:spTgt spid="7"/>
-                                        </p:tgtEl>
-                                        <p:attrNameLst>
-                                          <p:attrName>style.visibility</p:attrName>
-                                        </p:attrNameLst>
-                                      </p:cBhvr>
-                                      <p:to>
-                                        <p:strVal val="visible"/>
-                                      </p:to>
-                                    </p:set>
-                                  </p:childTnLst>
-                                </p:cTn>
-                              </p:par>
-                            </p:childTnLst>
-                          </p:cTn>
-                        </p:par>
-                      </p:childTnLst>
-                    </p:cTn>
-                  </p:par>
-                  <p:par>
-                    <p:cTn id="7" fill="hold">
-                      <p:stCondLst>
-                        <p:cond delay="indefinite"/>
-                      </p:stCondLst>
-                      <p:childTnLst>
-                        <p:par>
-                          <p:cTn id="8" fill="hold">
-                            <p:stCondLst>
-                              <p:cond delay="0"/>
-                            </p:stCondLst>
-                            <p:childTnLst>
-                              <p:par>
-                                <p:cTn id="9" presetID="1" presetClass="entr" presetSubtype="0" fill="hold" nodeType="clickEffect">
-                                  <p:stCondLst>
-                                    <p:cond delay="0"/>
-                                  </p:stCondLst>
-                                  <p:childTnLst>
-                                    <p:set>
-                                      <p:cBhvr>
-                                        <p:cTn id="10" dur="1" fill="hold">
-                                          <p:stCondLst>
-                                            <p:cond delay="0"/>
-                                          </p:stCondLst>
-                                        </p:cTn>
-                                        <p:tgtEl>
-                                          <p:spTgt spid="7">
-                                            <p:txEl>
-                                              <p:pRg st="2" end="2"/>
-                                            </p:txEl>
-                                          </p:spTgt>
-                                        </p:tgtEl>
-                                        <p:attrNameLst>
-                                          <p:attrName>style.visibility</p:attrName>
-                                        </p:attrNameLst>
-                                      </p:cBhvr>
-                                      <p:to>
-                                        <p:strVal val="visible"/>
-                                      </p:to>
-                                    </p:set>
-                                  </p:childTnLst>
-                                </p:cTn>
-                              </p:par>
-                            </p:childTnLst>
-                          </p:cTn>
-                        </p:par>
-                      </p:childTnLst>
-                    </p:cTn>
-                  </p:par>
-                  <p:par>
-                    <p:cTn id="11" fill="hold">
-                      <p:stCondLst>
-                        <p:cond delay="indefinite"/>
-                      </p:stCondLst>
-                      <p:childTnLst>
-                        <p:par>
-                          <p:cTn id="12" fill="hold">
-                            <p:stCondLst>
-                              <p:cond delay="0"/>
-                            </p:stCondLst>
-                            <p:childTnLst>
-                              <p:par>
-                                <p:cTn id="13" presetID="1" presetClass="entr" presetSubtype="0" fill="hold" nodeType="clickEffect">
-                                  <p:stCondLst>
-                                    <p:cond delay="0"/>
-                                  </p:stCondLst>
-                                  <p:childTnLst>
-                                    <p:set>
-                                      <p:cBhvr>
-                                        <p:cTn id="14" dur="1" fill="hold">
-                                          <p:stCondLst>
-                                            <p:cond delay="0"/>
-                                          </p:stCondLst>
-                                        </p:cTn>
-                                        <p:tgtEl>
-                                          <p:spTgt spid="7">
-                                            <p:txEl>
-                                              <p:pRg st="4" end="4"/>
-                                            </p:txEl>
-                                          </p:spTgt>
-                                        </p:tgtEl>
-                                        <p:attrNameLst>
-                                          <p:attrName>style.visibility</p:attrName>
-                                        </p:attrNameLst>
-                                      </p:cBhvr>
-                                      <p:to>
-                                        <p:strVal val="visible"/>
-                                      </p:to>
-                                    </p:set>
-                                  </p:childTnLst>
-                                </p:cTn>
-                              </p:par>
-                              <p:par>
-                                <p:cTn id="15" presetID="1" presetClass="entr" presetSubtype="0" fill="hold" nodeType="withEffect">
-                                  <p:stCondLst>
-                                    <p:cond delay="0"/>
-                                  </p:stCondLst>
-                                  <p:childTnLst>
-                                    <p:set>
-                                      <p:cBhvr>
-                                        <p:cTn id="16" dur="1" fill="hold">
-                                          <p:stCondLst>
-                                            <p:cond delay="0"/>
-                                          </p:stCondLst>
-                                        </p:cTn>
-                                        <p:tgtEl>
-                                          <p:spTgt spid="7">
-                                            <p:txEl>
-                                              <p:pRg st="5" end="5"/>
-                                            </p:txEl>
-                                          </p:spTgt>
-                                        </p:tgtEl>
-                                        <p:attrNameLst>
-                                          <p:attrName>style.visibility</p:attrName>
-                                        </p:attrNameLst>
-                                      </p:cBhvr>
-                                      <p:to>
-                                        <p:strVal val="visible"/>
-                                      </p:to>
-                                    </p:set>
-                                  </p:childTnLst>
-                                </p:cTn>
-                              </p:par>
-                              <p:par>
-                                <p:cTn id="17" presetID="1" presetClass="entr" presetSubtype="0" fill="hold" nodeType="withEffect">
-                                  <p:stCondLst>
-                                    <p:cond delay="0"/>
-                                  </p:stCondLst>
-                                  <p:childTnLst>
-                                    <p:set>
-                                      <p:cBhvr>
-                                        <p:cTn id="18" dur="1" fill="hold">
-                                          <p:stCondLst>
-                                            <p:cond delay="0"/>
-                                          </p:stCondLst>
-                                        </p:cTn>
-                                        <p:tgtEl>
-                                          <p:spTgt spid="7">
-                                            <p:txEl>
-                                              <p:pRg st="6" end="6"/>
-                                            </p:txEl>
-                                          </p:spTgt>
-                                        </p:tgtEl>
-                                        <p:attrNameLst>
-                                          <p:attrName>style.visibility</p:attrName>
-                                        </p:attrNameLst>
-                                      </p:cBhvr>
-                                      <p:to>
-                                        <p:strVal val="visible"/>
-                                      </p:to>
-                                    </p:set>
-                                  </p:childTnLst>
-                                </p:cTn>
-                              </p:par>
-                              <p:par>
-                                <p:cTn id="19" presetID="1" presetClass="entr" presetSubtype="0" fill="hold" nodeType="withEffect">
-                                  <p:stCondLst>
-                                    <p:cond delay="0"/>
-                                  </p:stCondLst>
-                                  <p:childTnLst>
-                                    <p:set>
-                                      <p:cBhvr>
-                                        <p:cTn id="20" dur="1" fill="hold">
-                                          <p:stCondLst>
-                                            <p:cond delay="0"/>
-                                          </p:stCondLst>
-                                        </p:cTn>
-                                        <p:tgtEl>
-                                          <p:spTgt spid="7">
-                                            <p:txEl>
-                                              <p:pRg st="7" end="7"/>
-                                            </p:txEl>
-                                          </p:spTgt>
-                                        </p:tgtEl>
-                                        <p:attrNameLst>
-                                          <p:attrName>style.visibility</p:attrName>
-                                        </p:attrNameLst>
-                                      </p:cBhvr>
-                                      <p:to>
-                                        <p:strVal val="visible"/>
-                                      </p:to>
-                                    </p:set>
-                                  </p:childTnLst>
-                                </p:cTn>
-                              </p:par>
-                            </p:childTnLst>
-                          </p:cTn>
-                        </p:par>
-                      </p:childTnLst>
-                    </p:cTn>
-                  </p:par>
-                </p:childTnLst>
-              </p:cTn>
-              <p:prevCondLst>
-                <p:cond evt="onPrev" delay="0">
-                  <p:tgtEl>
-                    <p:sldTgt/>
-                  </p:tgtEl>
-                </p:cond>
-              </p:prevCondLst>
-              <p:nextCondLst>
-                <p:cond evt="onNext" delay="0">
-                  <p:tgtEl>
-                    <p:sldTgt/>
-                  </p:tgtEl>
-                </p:cond>
-              </p:nextCondLst>
-            </p:seq>
-          </p:childTnLst>
-        </p:cTn>
-      </p:par>
-    </p:tnLst>
-    <p:bldLst>
-      <p:bldP spid="7" grpId="0" animBg="1"/>
-    </p:bldLst>
-  </p:timing>
-</p:sld>
-</file>
-
-<file path=ppt/slides/slide25.xml><?xml version="1.0" encoding="utf-8"?>
-<p:sld xmlns:a="http://schemas.openxmlformats.org/drawingml/2006/main" xmlns:r="http://schemas.openxmlformats.org/officeDocument/2006/relationships" xmlns:p="http://schemas.openxmlformats.org/presentationml/2006/main">
-  <p:cSld>
-    <p:spTree>
-      <p:nvGrpSpPr>
-        <p:cNvPr id="1" name=""/>
-        <p:cNvGrpSpPr/>
-        <p:nvPr/>
-      </p:nvGrpSpPr>
-      <p:grpSpPr>
-        <a:xfrm>
-          <a:off x="0" y="0"/>
-          <a:ext cx="0" cy="0"/>
-          <a:chOff x="0" y="0"/>
-          <a:chExt cx="0" cy="0"/>
-        </a:xfrm>
-      </p:grpSpPr>
-      <p:sp>
-        <p:nvSpPr>
-          <p:cNvPr id="5" name="Title 4">
-            <a:extLst>
-              <a:ext uri="{FF2B5EF4-FFF2-40B4-BE49-F238E27FC236}">
                 <a16:creationId xmlns:a16="http://schemas.microsoft.com/office/drawing/2014/main" id="{92BBAA18-210B-4A76-B37A-08184D5B43F6}"/>
               </a:ext>
             </a:extLst>
@@ -28569,7 +27898,7 @@
 </p:sld>
 </file>
 
-<file path=ppt/slides/slide26.xml><?xml version="1.0" encoding="utf-8"?>
+<file path=ppt/slides/slide25.xml><?xml version="1.0" encoding="utf-8"?>
 <p:sld xmlns:a="http://schemas.openxmlformats.org/drawingml/2006/main" xmlns:r="http://schemas.openxmlformats.org/officeDocument/2006/relationships" xmlns:p="http://schemas.openxmlformats.org/presentationml/2006/main">
   <p:cSld>
     <p:spTree>
@@ -29348,7 +28677,7 @@
             <a:fld id="{2BF067CD-8E6B-4360-9AA8-C5DF2A48A6D1}" type="slidenum">
               <a:rPr lang="en-US" smtClean="0"/>
               <a:pPr/>
-              <a:t>26</a:t>
+              <a:t>25</a:t>
             </a:fld>
             <a:endParaRPr lang="en-US" dirty="0"/>
           </a:p>
@@ -29875,7 +29204,7 @@
 </p:sld>
 </file>
 
-<file path=ppt/slides/slide27.xml><?xml version="1.0" encoding="utf-8"?>
+<file path=ppt/slides/slide26.xml><?xml version="1.0" encoding="utf-8"?>
 <p:sld xmlns:a="http://schemas.openxmlformats.org/drawingml/2006/main" xmlns:r="http://schemas.openxmlformats.org/officeDocument/2006/relationships" xmlns:p="http://schemas.openxmlformats.org/presentationml/2006/main">
   <p:cSld>
     <p:spTree>
@@ -30335,7 +29664,7 @@
             <a:fld id="{2BF067CD-8E6B-4360-9AA8-C5DF2A48A6D1}" type="slidenum">
               <a:rPr lang="en-US" smtClean="0"/>
               <a:pPr/>
-              <a:t>27</a:t>
+              <a:t>26</a:t>
             </a:fld>
             <a:endParaRPr lang="en-US" dirty="0"/>
           </a:p>
@@ -30577,7 +29906,7 @@
 </p:sld>
 </file>
 
-<file path=ppt/slides/slide28.xml><?xml version="1.0" encoding="utf-8"?>
+<file path=ppt/slides/slide27.xml><?xml version="1.0" encoding="utf-8"?>
 <p:sld xmlns:a="http://schemas.openxmlformats.org/drawingml/2006/main" xmlns:r="http://schemas.openxmlformats.org/officeDocument/2006/relationships" xmlns:p="http://schemas.openxmlformats.org/presentationml/2006/main">
   <p:cSld>
     <p:spTree>
@@ -31288,7 +30617,7 @@
             <a:fld id="{2BF067CD-8E6B-4360-9AA8-C5DF2A48A6D1}" type="slidenum">
               <a:rPr lang="en-US" smtClean="0"/>
               <a:pPr/>
-              <a:t>28</a:t>
+              <a:t>27</a:t>
             </a:fld>
             <a:endParaRPr lang="en-US" dirty="0"/>
           </a:p>
@@ -31696,7 +31025,7 @@
 </p:sld>
 </file>
 
-<file path=ppt/slides/slide29.xml><?xml version="1.0" encoding="utf-8"?>
+<file path=ppt/slides/slide28.xml><?xml version="1.0" encoding="utf-8"?>
 <p:sld xmlns:a="http://schemas.openxmlformats.org/drawingml/2006/main" xmlns:r="http://schemas.openxmlformats.org/officeDocument/2006/relationships" xmlns:p="http://schemas.openxmlformats.org/presentationml/2006/main">
   <p:cSld>
     <p:spTree>
@@ -32140,7 +31469,7 @@
             <a:fld id="{2BF067CD-8E6B-4360-9AA8-C5DF2A48A6D1}" type="slidenum">
               <a:rPr lang="en-US" smtClean="0"/>
               <a:pPr/>
-              <a:t>29</a:t>
+              <a:t>28</a:t>
             </a:fld>
             <a:endParaRPr lang="en-US" dirty="0"/>
           </a:p>
@@ -32597,111 +31926,7 @@
 </p:sld>
 </file>
 
-<file path=ppt/slides/slide3.xml><?xml version="1.0" encoding="utf-8"?>
-<p:sld xmlns:a="http://schemas.openxmlformats.org/drawingml/2006/main" xmlns:r="http://schemas.openxmlformats.org/officeDocument/2006/relationships" xmlns:p="http://schemas.openxmlformats.org/presentationml/2006/main">
-  <p:cSld>
-    <p:spTree>
-      <p:nvGrpSpPr>
-        <p:cNvPr id="1" name=""/>
-        <p:cNvGrpSpPr/>
-        <p:nvPr/>
-      </p:nvGrpSpPr>
-      <p:grpSpPr>
-        <a:xfrm>
-          <a:off x="0" y="0"/>
-          <a:ext cx="0" cy="0"/>
-          <a:chOff x="0" y="0"/>
-          <a:chExt cx="0" cy="0"/>
-        </a:xfrm>
-      </p:grpSpPr>
-      <p:sp>
-        <p:nvSpPr>
-          <p:cNvPr id="3" name="Title 2">
-            <a:extLst>
-              <a:ext uri="{FF2B5EF4-FFF2-40B4-BE49-F238E27FC236}">
-                <a16:creationId xmlns:a16="http://schemas.microsoft.com/office/drawing/2014/main" id="{6FB18FE3-0649-439F-938A-D1385061D408}"/>
-              </a:ext>
-            </a:extLst>
-          </p:cNvPr>
-          <p:cNvSpPr>
-            <a:spLocks noGrp="1"/>
-          </p:cNvSpPr>
-          <p:nvPr>
-            <p:ph type="title" sz="quarter" idx="10"/>
-          </p:nvPr>
-        </p:nvSpPr>
-        <p:spPr/>
-        <p:txBody>
-          <a:bodyPr/>
-          <a:lstStyle/>
-          <a:p>
-            <a:r>
-              <a:rPr lang="bg-BG" dirty="0"/>
-              <a:t>Какво е обект? Какво е клас?</a:t>
-            </a:r>
-            <a:endParaRPr lang="en-US" dirty="0"/>
-          </a:p>
-        </p:txBody>
-      </p:sp>
-      <p:pic>
-        <p:nvPicPr>
-          <p:cNvPr id="7" name="Picture 6"/>
-          <p:cNvPicPr>
-            <a:picLocks noChangeAspect="1"/>
-          </p:cNvPicPr>
-          <p:nvPr/>
-        </p:nvPicPr>
-        <p:blipFill>
-          <a:blip r:embed="rId2">
-            <a:duotone>
-              <a:schemeClr val="bg2">
-                <a:shade val="45000"/>
-                <a:satMod val="135000"/>
-              </a:schemeClr>
-              <a:prstClr val="white"/>
-            </a:duotone>
-            <a:extLst>
-              <a:ext uri="{28A0092B-C50C-407E-A947-70E740481C1C}">
-                <a14:useLocalDpi xmlns:a14="http://schemas.microsoft.com/office/drawing/2010/main" val="0"/>
-              </a:ext>
-            </a:extLst>
-          </a:blip>
-          <a:stretch>
-            <a:fillRect/>
-          </a:stretch>
-        </p:blipFill>
-        <p:spPr>
-          <a:xfrm>
-            <a:off x="4894155" y="1524496"/>
-            <a:ext cx="2403690" cy="2403690"/>
-          </a:xfrm>
-          <a:prstGeom prst="rect">
-            <a:avLst/>
-          </a:prstGeom>
-        </p:spPr>
-      </p:pic>
-    </p:spTree>
-    <p:extLst>
-      <p:ext uri="{BB962C8B-B14F-4D97-AF65-F5344CB8AC3E}">
-        <p14:creationId xmlns:p14="http://schemas.microsoft.com/office/powerpoint/2010/main" val="2347864479"/>
-      </p:ext>
-    </p:extLst>
-  </p:cSld>
-  <p:clrMapOvr>
-    <a:masterClrMapping/>
-  </p:clrMapOvr>
-  <mc:AlternateContent xmlns:mc="http://schemas.openxmlformats.org/markup-compatibility/2006" xmlns:p14="http://schemas.microsoft.com/office/powerpoint/2010/main">
-    <mc:Choice Requires="p14">
-      <p:transition p14:dur="0" advClick="0" advTm="5000"/>
-    </mc:Choice>
-    <mc:Fallback xmlns="">
-      <p:transition advClick="0" advTm="5000"/>
-    </mc:Fallback>
-  </mc:AlternateContent>
-</p:sld>
-</file>
-
-<file path=ppt/slides/slide30.xml><?xml version="1.0" encoding="utf-8"?>
+<file path=ppt/slides/slide29.xml><?xml version="1.0" encoding="utf-8"?>
 <p:sld xmlns:a="http://schemas.openxmlformats.org/drawingml/2006/main" xmlns:r="http://schemas.openxmlformats.org/officeDocument/2006/relationships" xmlns:p="http://schemas.openxmlformats.org/presentationml/2006/main">
   <p:cSld>
     <p:spTree>
@@ -33212,7 +32437,7 @@
             <a:fld id="{2BF067CD-8E6B-4360-9AA8-C5DF2A48A6D1}" type="slidenum">
               <a:rPr lang="en-US" smtClean="0"/>
               <a:pPr/>
-              <a:t>30</a:t>
+              <a:t>29</a:t>
             </a:fld>
             <a:endParaRPr lang="en-US" dirty="0"/>
           </a:p>
@@ -33565,7 +32790,111 @@
 </p:sld>
 </file>
 
-<file path=ppt/slides/slide31.xml><?xml version="1.0" encoding="utf-8"?>
+<file path=ppt/slides/slide3.xml><?xml version="1.0" encoding="utf-8"?>
+<p:sld xmlns:a="http://schemas.openxmlformats.org/drawingml/2006/main" xmlns:r="http://schemas.openxmlformats.org/officeDocument/2006/relationships" xmlns:p="http://schemas.openxmlformats.org/presentationml/2006/main">
+  <p:cSld>
+    <p:spTree>
+      <p:nvGrpSpPr>
+        <p:cNvPr id="1" name=""/>
+        <p:cNvGrpSpPr/>
+        <p:nvPr/>
+      </p:nvGrpSpPr>
+      <p:grpSpPr>
+        <a:xfrm>
+          <a:off x="0" y="0"/>
+          <a:ext cx="0" cy="0"/>
+          <a:chOff x="0" y="0"/>
+          <a:chExt cx="0" cy="0"/>
+        </a:xfrm>
+      </p:grpSpPr>
+      <p:sp>
+        <p:nvSpPr>
+          <p:cNvPr id="3" name="Title 2">
+            <a:extLst>
+              <a:ext uri="{FF2B5EF4-FFF2-40B4-BE49-F238E27FC236}">
+                <a16:creationId xmlns:a16="http://schemas.microsoft.com/office/drawing/2014/main" id="{6FB18FE3-0649-439F-938A-D1385061D408}"/>
+              </a:ext>
+            </a:extLst>
+          </p:cNvPr>
+          <p:cNvSpPr>
+            <a:spLocks noGrp="1"/>
+          </p:cNvSpPr>
+          <p:nvPr>
+            <p:ph type="title" sz="quarter" idx="10"/>
+          </p:nvPr>
+        </p:nvSpPr>
+        <p:spPr/>
+        <p:txBody>
+          <a:bodyPr/>
+          <a:lstStyle/>
+          <a:p>
+            <a:r>
+              <a:rPr lang="bg-BG" dirty="0"/>
+              <a:t>Какво е обект? Какво е клас?</a:t>
+            </a:r>
+            <a:endParaRPr lang="en-US" dirty="0"/>
+          </a:p>
+        </p:txBody>
+      </p:sp>
+      <p:pic>
+        <p:nvPicPr>
+          <p:cNvPr id="7" name="Picture 6"/>
+          <p:cNvPicPr>
+            <a:picLocks noChangeAspect="1"/>
+          </p:cNvPicPr>
+          <p:nvPr/>
+        </p:nvPicPr>
+        <p:blipFill>
+          <a:blip r:embed="rId2">
+            <a:duotone>
+              <a:schemeClr val="bg2">
+                <a:shade val="45000"/>
+                <a:satMod val="135000"/>
+              </a:schemeClr>
+              <a:prstClr val="white"/>
+            </a:duotone>
+            <a:extLst>
+              <a:ext uri="{28A0092B-C50C-407E-A947-70E740481C1C}">
+                <a14:useLocalDpi xmlns:a14="http://schemas.microsoft.com/office/drawing/2010/main" val="0"/>
+              </a:ext>
+            </a:extLst>
+          </a:blip>
+          <a:stretch>
+            <a:fillRect/>
+          </a:stretch>
+        </p:blipFill>
+        <p:spPr>
+          <a:xfrm>
+            <a:off x="4894155" y="1524496"/>
+            <a:ext cx="2403690" cy="2403690"/>
+          </a:xfrm>
+          <a:prstGeom prst="rect">
+            <a:avLst/>
+          </a:prstGeom>
+        </p:spPr>
+      </p:pic>
+    </p:spTree>
+    <p:extLst>
+      <p:ext uri="{BB962C8B-B14F-4D97-AF65-F5344CB8AC3E}">
+        <p14:creationId xmlns:p14="http://schemas.microsoft.com/office/powerpoint/2010/main" val="2347864479"/>
+      </p:ext>
+    </p:extLst>
+  </p:cSld>
+  <p:clrMapOvr>
+    <a:masterClrMapping/>
+  </p:clrMapOvr>
+  <mc:AlternateContent xmlns:mc="http://schemas.openxmlformats.org/markup-compatibility/2006" xmlns:p14="http://schemas.microsoft.com/office/powerpoint/2010/main">
+    <mc:Choice Requires="p14">
+      <p:transition p14:dur="0" advClick="0" advTm="5000"/>
+    </mc:Choice>
+    <mc:Fallback xmlns="">
+      <p:transition advClick="0" advTm="5000"/>
+    </mc:Fallback>
+  </mc:AlternateContent>
+</p:sld>
+</file>
+
+<file path=ppt/slides/slide30.xml><?xml version="1.0" encoding="utf-8"?>
 <p:sld xmlns:a="http://schemas.openxmlformats.org/drawingml/2006/main" xmlns:r="http://schemas.openxmlformats.org/officeDocument/2006/relationships" xmlns:p="http://schemas.openxmlformats.org/presentationml/2006/main">
   <p:cSld>
     <p:spTree>
@@ -33686,7 +33015,7 @@
 </p:sld>
 </file>
 
-<file path=ppt/slides/slide32.xml><?xml version="1.0" encoding="utf-8"?>
+<file path=ppt/slides/slide31.xml><?xml version="1.0" encoding="utf-8"?>
 <p:sld xmlns:a="http://schemas.openxmlformats.org/drawingml/2006/main" xmlns:r="http://schemas.openxmlformats.org/officeDocument/2006/relationships" xmlns:p="http://schemas.openxmlformats.org/presentationml/2006/main">
   <p:cSld>
     <p:spTree>
@@ -33727,7 +33056,19 @@
           <a:p>
             <a:r>
               <a:rPr lang="bg-BG" sz="3000" dirty="0"/>
-              <a:t>Когато конструкторът е извикан</a:t>
+              <a:t>Когато </a:t>
+            </a:r>
+            <a:r>
+              <a:rPr lang="bg-BG" sz="3000" b="1" dirty="0">
+                <a:solidFill>
+                  <a:schemeClr val="bg1"/>
+                </a:solidFill>
+              </a:rPr>
+              <a:t>конструкторът</a:t>
+            </a:r>
+            <a:r>
+              <a:rPr lang="bg-BG" sz="3000" dirty="0"/>
+              <a:t> е извикан</a:t>
             </a:r>
             <a:r>
               <a:rPr lang="en-GB" sz="3000" dirty="0"/>
@@ -33735,7 +33076,19 @@
             </a:r>
             <a:r>
               <a:rPr lang="bg-BG" sz="3000" dirty="0"/>
-              <a:t>създава инстанция на класа и обикновено инициализира неговите членове</a:t>
+              <a:t>създава </a:t>
+            </a:r>
+            <a:r>
+              <a:rPr lang="bg-BG" sz="3000" b="1" dirty="0">
+                <a:solidFill>
+                  <a:schemeClr val="bg1"/>
+                </a:solidFill>
+              </a:rPr>
+              <a:t>инстанция</a:t>
+            </a:r>
+            <a:r>
+              <a:rPr lang="bg-BG" sz="3000" dirty="0"/>
+              <a:t> на класа и обикновено инициализира неговите членове</a:t>
             </a:r>
             <a:endParaRPr lang="en-GB" sz="3000" dirty="0"/>
           </a:p>
@@ -34557,7 +33910,7 @@
             <a:fld id="{2BF067CD-8E6B-4360-9AA8-C5DF2A48A6D1}" type="slidenum">
               <a:rPr lang="en-US" smtClean="0"/>
               <a:pPr/>
-              <a:t>32</a:t>
+              <a:t>31</a:t>
             </a:fld>
             <a:endParaRPr lang="en-US" dirty="0"/>
           </a:p>
@@ -34757,7 +34110,7 @@
 </p:sld>
 </file>
 
-<file path=ppt/slides/slide33.xml><?xml version="1.0" encoding="utf-8"?>
+<file path=ppt/slides/slide32.xml><?xml version="1.0" encoding="utf-8"?>
 <p:sld xmlns:a="http://schemas.openxmlformats.org/drawingml/2006/main" xmlns:r="http://schemas.openxmlformats.org/officeDocument/2006/relationships" xmlns:p="http://schemas.openxmlformats.org/presentationml/2006/main">
   <p:cSld>
     <p:spTree>
@@ -35622,7 +34975,7 @@
             <a:fld id="{2BF067CD-8E6B-4360-9AA8-C5DF2A48A6D1}" type="slidenum">
               <a:rPr lang="en-US" smtClean="0"/>
               <a:pPr/>
-              <a:t>33</a:t>
+              <a:t>32</a:t>
             </a:fld>
             <a:endParaRPr lang="en-US" dirty="0"/>
           </a:p>
@@ -36048,7 +35401,7 @@
 </p:sld>
 </file>
 
-<file path=ppt/slides/slide34.xml><?xml version="1.0" encoding="utf-8"?>
+<file path=ppt/slides/slide33.xml><?xml version="1.0" encoding="utf-8"?>
 <p:sld xmlns:a="http://schemas.openxmlformats.org/drawingml/2006/main" xmlns:r="http://schemas.openxmlformats.org/officeDocument/2006/relationships" xmlns:p="http://schemas.openxmlformats.org/presentationml/2006/main">
   <p:cSld>
     <p:spTree>
@@ -36740,7 +36093,7 @@
             <a:fld id="{2BF067CD-8E6B-4360-9AA8-C5DF2A48A6D1}" type="slidenum">
               <a:rPr lang="en-US" smtClean="0"/>
               <a:pPr/>
-              <a:t>34</a:t>
+              <a:t>33</a:t>
             </a:fld>
             <a:endParaRPr lang="en-US" dirty="0"/>
           </a:p>
@@ -37166,7 +36519,7 @@
 </p:sld>
 </file>
 
-<file path=ppt/slides/slide35.xml><?xml version="1.0" encoding="utf-8"?>
+<file path=ppt/slides/slide34.xml><?xml version="1.0" encoding="utf-8"?>
 <p:sld xmlns:a="http://schemas.openxmlformats.org/drawingml/2006/main" xmlns:r="http://schemas.openxmlformats.org/officeDocument/2006/relationships" xmlns:p="http://schemas.openxmlformats.org/presentationml/2006/main">
   <p:cSld>
     <p:spTree>
@@ -37206,7 +36559,19 @@
           <a:p>
             <a:r>
               <a:rPr lang="bg-BG" dirty="0"/>
-              <a:t>Един клас може да има множество конструктори</a:t>
+              <a:t>Един клас може да има </a:t>
+            </a:r>
+            <a:r>
+              <a:rPr lang="bg-BG" sz="3600" b="1" dirty="0">
+                <a:solidFill>
+                  <a:schemeClr val="bg1"/>
+                </a:solidFill>
+              </a:rPr>
+              <a:t>множество</a:t>
+            </a:r>
+            <a:r>
+              <a:rPr lang="bg-BG" dirty="0"/>
+              <a:t> конструктори</a:t>
             </a:r>
             <a:endParaRPr lang="en-US" dirty="0"/>
           </a:p>
@@ -38000,7 +37365,7 @@
             <a:fld id="{2BF067CD-8E6B-4360-9AA8-C5DF2A48A6D1}" type="slidenum">
               <a:rPr lang="en-US" noProof="0" smtClean="0"/>
               <a:pPr/>
-              <a:t>35</a:t>
+              <a:t>34</a:t>
             </a:fld>
             <a:endParaRPr lang="en-US" noProof="0" dirty="0"/>
           </a:p>
@@ -38293,7 +37658,7 @@
 </p:sld>
 </file>
 
-<file path=ppt/slides/slide36.xml><?xml version="1.0" encoding="utf-8"?>
+<file path=ppt/slides/slide35.xml><?xml version="1.0" encoding="utf-8"?>
 <p:sld xmlns:a="http://schemas.openxmlformats.org/drawingml/2006/main" xmlns:r="http://schemas.openxmlformats.org/officeDocument/2006/relationships" xmlns:p="http://schemas.openxmlformats.org/presentationml/2006/main">
   <p:cSld>
     <p:spTree>
@@ -38338,7 +37703,7 @@
           <a:p>
             <a:r>
               <a:rPr lang="bg-BG" dirty="0"/>
-              <a:t>Един конструктор може да извика другия</a:t>
+              <a:t>Единият конструктор може да извика другия</a:t>
             </a:r>
             <a:endParaRPr lang="en-GB" dirty="0"/>
           </a:p>
@@ -38763,7 +38128,7 @@
         </p:nvSpPr>
         <p:spPr bwMode="auto">
           <a:xfrm>
-            <a:off x="8780300" y="4895354"/>
+            <a:off x="8780301" y="5221622"/>
             <a:ext cx="3411699" cy="1531882"/>
           </a:xfrm>
           <a:prstGeom prst="wedgeRoundRectCallout">
@@ -38962,9 +38327,43 @@
             <a:fld id="{2BF067CD-8E6B-4360-9AA8-C5DF2A48A6D1}" type="slidenum">
               <a:rPr lang="en-US" noProof="0" smtClean="0"/>
               <a:pPr/>
-              <a:t>36</a:t>
+              <a:t>35</a:t>
             </a:fld>
             <a:endParaRPr lang="en-US" noProof="0" dirty="0"/>
+          </a:p>
+        </p:txBody>
+      </p:sp>
+      <p:sp>
+        <p:nvSpPr>
+          <p:cNvPr id="4" name="Title 3">
+            <a:extLst>
+              <a:ext uri="{FF2B5EF4-FFF2-40B4-BE49-F238E27FC236}">
+                <a16:creationId xmlns:a16="http://schemas.microsoft.com/office/drawing/2014/main" id="{3AB52913-7F05-0402-99A5-90DD453629C7}"/>
+              </a:ext>
+            </a:extLst>
+          </p:cNvPr>
+          <p:cNvSpPr>
+            <a:spLocks noGrp="1"/>
+          </p:cNvSpPr>
+          <p:nvPr>
+            <p:ph type="title"/>
+          </p:nvPr>
+        </p:nvSpPr>
+        <p:spPr>
+          <a:xfrm>
+            <a:off x="190406" y="100750"/>
+            <a:ext cx="9715594" cy="882654"/>
+          </a:xfrm>
+        </p:spPr>
+        <p:txBody>
+          <a:bodyPr/>
+          <a:lstStyle/>
+          <a:p>
+            <a:r>
+              <a:rPr lang="bg-BG" dirty="0"/>
+              <a:t>Множество конструктори</a:t>
+            </a:r>
+            <a:endParaRPr lang="en-US" dirty="0"/>
           </a:p>
         </p:txBody>
       </p:sp>
@@ -39348,7 +38747,7 @@
 </p:sld>
 </file>
 
-<file path=ppt/slides/slide37.xml><?xml version="1.0" encoding="utf-8"?>
+<file path=ppt/slides/slide36.xml><?xml version="1.0" encoding="utf-8"?>
 <p:sld xmlns:a="http://schemas.openxmlformats.org/drawingml/2006/main" xmlns:r="http://schemas.openxmlformats.org/officeDocument/2006/relationships" xmlns:p="http://schemas.openxmlformats.org/presentationml/2006/main">
   <p:cSld>
     <p:spTree>
@@ -40481,7 +39880,7 @@
             <a:fld id="{2BF067CD-8E6B-4360-9AA8-C5DF2A48A6D1}" type="slidenum">
               <a:rPr lang="en-US" noProof="0" smtClean="0"/>
               <a:pPr/>
-              <a:t>37</a:t>
+              <a:t>36</a:t>
             </a:fld>
             <a:endParaRPr lang="en-US" noProof="0" dirty="0"/>
           </a:p>
@@ -40881,7 +40280,7 @@
 </p:sld>
 </file>
 
-<file path=ppt/slides/slide38.xml><?xml version="1.0" encoding="utf-8"?>
+<file path=ppt/slides/slide37.xml><?xml version="1.0" encoding="utf-8"?>
 <p:sld xmlns:a="http://schemas.openxmlformats.org/drawingml/2006/main" xmlns:r="http://schemas.openxmlformats.org/officeDocument/2006/relationships" xmlns:p="http://schemas.openxmlformats.org/presentationml/2006/main">
   <p:cSld>
     <p:spTree>
@@ -40960,7 +40359,7 @@
 </p:sld>
 </file>
 
-<file path=ppt/slides/slide39.xml><?xml version="1.0" encoding="utf-8"?>
+<file path=ppt/slides/slide38.xml><?xml version="1.0" encoding="utf-8"?>
 <p:sld xmlns:a="http://schemas.openxmlformats.org/drawingml/2006/main" xmlns:r="http://schemas.openxmlformats.org/officeDocument/2006/relationships" xmlns:p="http://schemas.openxmlformats.org/presentationml/2006/main">
   <p:cSld>
     <p:spTree>
@@ -41224,7 +40623,7 @@
             <a:fld id="{2BF067CD-8E6B-4360-9AA8-C5DF2A48A6D1}" type="slidenum">
               <a:rPr lang="en-US" noProof="0" smtClean="0"/>
               <a:pPr/>
-              <a:t>39</a:t>
+              <a:t>38</a:t>
             </a:fld>
             <a:endParaRPr lang="en-US" noProof="0" dirty="0"/>
           </a:p>
@@ -41354,7 +40753,7 @@
             </a:r>
             <a:r>
               <a:rPr lang="bg-BG" sz="2800" dirty="0"/>
-              <a:t>поредица от наименувани стойности.</a:t>
+              <a:t>поредица от именувани стойности.</a:t>
             </a:r>
             <a:endParaRPr lang="en-US" sz="2800" dirty="0"/>
           </a:p>
@@ -41445,12 +40844,16 @@
               <a:t> </a:t>
             </a:r>
             <a:r>
+              <a:rPr lang="bg-BG" sz="2800" dirty="0"/>
+              <a:t>за</a:t>
+            </a:r>
+            <a:r>
               <a:rPr lang="bg-BG" sz="2800" b="1" dirty="0">
                 <a:solidFill>
                   <a:schemeClr val="bg1"/>
                 </a:solidFill>
               </a:rPr>
-              <a:t>за рожден ден</a:t>
+              <a:t> рожден ден</a:t>
             </a:r>
             <a:r>
               <a:rPr lang="en-US" sz="2800" b="1" dirty="0">
@@ -43282,12 +42685,12 @@
               </a:buClr>
             </a:pPr>
             <a:r>
-              <a:rPr lang="en-US" sz="3200" b="1" dirty="0">
+              <a:rPr lang="bg-BG" sz="3200" b="1" dirty="0">
                 <a:solidFill>
                   <a:schemeClr val="bg1"/>
                 </a:solidFill>
               </a:rPr>
-              <a:t>Actions</a:t>
+              <a:t>Действия</a:t>
             </a:r>
             <a:r>
               <a:rPr lang="en-US" sz="3200" dirty="0"/>
@@ -44245,26 +43648,25 @@
               <a:lnSpc>
                 <a:spcPct val="100000"/>
               </a:lnSpc>
+              <a:buClr>
+                <a:schemeClr val="tx1"/>
+              </a:buClr>
             </a:pPr>
+            <a:r>
+              <a:rPr lang="bg-BG" sz="3599" b="1" dirty="0">
+                <a:solidFill>
+                  <a:schemeClr val="bg1"/>
+                </a:solidFill>
+              </a:rPr>
+              <a:t>Инстанцията</a:t>
+            </a:r>
             <a:r>
               <a:rPr lang="en-GB" sz="3599" dirty="0"/>
               <a:t> </a:t>
             </a:r>
             <a:r>
-              <a:rPr lang="bg-BG" sz="3599" b="1" dirty="0">
-                <a:solidFill>
-                  <a:schemeClr val="bg1"/>
-                </a:solidFill>
-              </a:rPr>
-              <a:t>Инстанцията</a:t>
-            </a:r>
-            <a:r>
-              <a:rPr lang="en-GB" sz="3599" dirty="0"/>
-              <a:t> </a:t>
-            </a:r>
-            <a:r>
               <a:rPr lang="bg-BG" sz="3599" dirty="0"/>
-              <a:t>представлява самият обект</a:t>
+              <a:t>е самият обект</a:t>
             </a:r>
             <a:r>
               <a:rPr lang="en-GB" sz="3599" dirty="0"/>

</xml_diff>

<commit_message>
Fixed animations for "7. Classes and Objects"
</commit_message>
<xml_diff>
--- a/Courses/Software-Sciences/Module-1-OOP-New/07-Classes-and-Objects/07-Classes-and-Objects.pptx
+++ b/Courses/Software-Sciences/Module-1-OOP-New/07-Classes-and-Objects/07-Classes-and-Objects.pptx
@@ -11902,11 +11902,11 @@
               </a:buClr>
             </a:pPr>
             <a:r>
-              <a:rPr lang="bg-BG"/>
+              <a:rPr lang="bg-BG" dirty="0"/>
               <a:t>Класът е </a:t>
             </a:r>
             <a:r>
-              <a:rPr lang="bg-BG" b="1">
+              <a:rPr lang="bg-BG" b="1" dirty="0">
                 <a:solidFill>
                   <a:schemeClr val="bg1"/>
                 </a:solidFill>
@@ -11914,7 +11914,7 @@
               <a:t>конкретна имплементация </a:t>
             </a:r>
             <a:r>
-              <a:rPr lang="bg-BG"/>
+              <a:rPr lang="bg-BG" dirty="0"/>
               <a:t>на АТД (абстрактен тип данни)</a:t>
             </a:r>
           </a:p>
@@ -11925,11 +11925,11 @@
               </a:buClr>
             </a:pPr>
             <a:r>
-              <a:rPr lang="bg-BG"/>
+              <a:rPr lang="bg-BG" dirty="0"/>
               <a:t>Класовете задават </a:t>
             </a:r>
             <a:r>
-              <a:rPr lang="bg-BG" b="1">
+              <a:rPr lang="bg-BG" b="1" dirty="0">
                 <a:solidFill>
                   <a:schemeClr val="bg1"/>
                 </a:solidFill>
@@ -11937,7 +11937,7 @@
               <a:t>структура</a:t>
             </a:r>
             <a:r>
-              <a:rPr lang="en-US" b="1">
+              <a:rPr lang="en-US" b="1" dirty="0">
                 <a:solidFill>
                   <a:schemeClr val="bg1"/>
                 </a:solidFill>
@@ -11945,11 +11945,11 @@
               <a:t> </a:t>
             </a:r>
             <a:r>
-              <a:rPr lang="bg-BG"/>
+              <a:rPr lang="bg-BG" dirty="0"/>
               <a:t>за</a:t>
             </a:r>
             <a:r>
-              <a:rPr lang="en-US" b="1">
+              <a:rPr lang="en-US" b="1" dirty="0">
                 <a:solidFill>
                   <a:schemeClr val="bg1"/>
                 </a:solidFill>
@@ -11957,7 +11957,7 @@
               <a:t> </a:t>
             </a:r>
             <a:r>
-              <a:rPr lang="bg-BG" b="1">
+              <a:rPr lang="bg-BG" b="1" dirty="0">
                 <a:solidFill>
                   <a:schemeClr val="bg1"/>
                 </a:solidFill>
@@ -11965,7 +11965,7 @@
               <a:t>описване</a:t>
             </a:r>
             <a:r>
-              <a:rPr lang="en-US" b="1">
+              <a:rPr lang="en-US" b="1" dirty="0">
                 <a:solidFill>
                   <a:schemeClr val="bg1"/>
                 </a:solidFill>
@@ -11973,11 +11973,11 @@
               <a:t> </a:t>
             </a:r>
             <a:r>
-              <a:rPr lang="bg-BG"/>
+              <a:rPr lang="bg-BG" dirty="0"/>
               <a:t>и</a:t>
             </a:r>
             <a:r>
-              <a:rPr lang="en-US" b="1">
+              <a:rPr lang="en-US" b="1" dirty="0">
                 <a:solidFill>
                   <a:schemeClr val="bg1"/>
                 </a:solidFill>
@@ -11985,14 +11985,14 @@
               <a:t> </a:t>
             </a:r>
             <a:br>
-              <a:rPr lang="en-US" b="1">
+              <a:rPr lang="en-US" b="1" dirty="0">
                 <a:solidFill>
                   <a:schemeClr val="bg1"/>
                 </a:solidFill>
               </a:rPr>
             </a:br>
             <a:r>
-              <a:rPr lang="bg-BG" b="1">
+              <a:rPr lang="bg-BG" b="1" dirty="0">
                 <a:solidFill>
                   <a:schemeClr val="bg1"/>
                 </a:solidFill>
@@ -12000,7 +12000,7 @@
               <a:t>създаване</a:t>
             </a:r>
             <a:r>
-              <a:rPr lang="en-US" b="1">
+              <a:rPr lang="en-US" b="1" dirty="0">
                 <a:solidFill>
                   <a:schemeClr val="bg1"/>
                 </a:solidFill>
@@ -12008,10 +12008,10 @@
               <a:t> </a:t>
             </a:r>
             <a:r>
-              <a:rPr lang="bg-BG"/>
+              <a:rPr lang="bg-BG" dirty="0"/>
               <a:t>на обекти</a:t>
             </a:r>
-            <a:endParaRPr lang="en-US"/>
+            <a:endParaRPr lang="en-US" dirty="0"/>
           </a:p>
         </p:txBody>
       </p:sp>
@@ -12695,7 +12695,7 @@
                             </p:stCondLst>
                             <p:childTnLst>
                               <p:par>
-                                <p:cTn id="5" presetID="1" presetClass="entr" presetSubtype="0" fill="hold" grpId="0" nodeType="clickEffect">
+                                <p:cTn id="5" presetID="1" presetClass="entr" presetSubtype="0" fill="hold" nodeType="clickEffect">
                                   <p:stCondLst>
                                     <p:cond delay="0"/>
                                   </p:stCondLst>
@@ -12708,7 +12708,11 @@
                                           </p:stCondLst>
                                         </p:cTn>
                                         <p:tgtEl>
-                                          <p:spTgt spid="18"/>
+                                          <p:spTgt spid="6">
+                                            <p:txEl>
+                                              <p:pRg st="1" end="1"/>
+                                            </p:txEl>
+                                          </p:spTgt>
                                         </p:tgtEl>
                                         <p:attrNameLst>
                                           <p:attrName>style.visibility</p:attrName>
@@ -12753,7 +12757,7 @@
                                           </p:stCondLst>
                                         </p:cTn>
                                         <p:tgtEl>
-                                          <p:spTgt spid="21"/>
+                                          <p:spTgt spid="18"/>
                                         </p:tgtEl>
                                         <p:attrNameLst>
                                           <p:attrName>style.visibility</p:attrName>
@@ -12798,7 +12802,7 @@
                                           </p:stCondLst>
                                         </p:cTn>
                                         <p:tgtEl>
-                                          <p:spTgt spid="19"/>
+                                          <p:spTgt spid="21"/>
                                         </p:tgtEl>
                                         <p:attrNameLst>
                                           <p:attrName>style.visibility</p:attrName>
@@ -12838,6 +12842,51 @@
                                     <p:set>
                                       <p:cBhvr>
                                         <p:cTn id="18" dur="1" fill="hold">
+                                          <p:stCondLst>
+                                            <p:cond delay="0"/>
+                                          </p:stCondLst>
+                                        </p:cTn>
+                                        <p:tgtEl>
+                                          <p:spTgt spid="19"/>
+                                        </p:tgtEl>
+                                        <p:attrNameLst>
+                                          <p:attrName>style.visibility</p:attrName>
+                                        </p:attrNameLst>
+                                      </p:cBhvr>
+                                      <p:to>
+                                        <p:strVal val="visible"/>
+                                      </p:to>
+                                    </p:set>
+                                  </p:childTnLst>
+                                </p:cTn>
+                              </p:par>
+                            </p:childTnLst>
+                          </p:cTn>
+                        </p:par>
+                      </p:childTnLst>
+                    </p:cTn>
+                  </p:par>
+                  <p:par>
+                    <p:cTn id="19" fill="hold">
+                      <p:stCondLst>
+                        <p:cond delay="indefinite"/>
+                      </p:stCondLst>
+                      <p:childTnLst>
+                        <p:par>
+                          <p:cTn id="20" fill="hold">
+                            <p:stCondLst>
+                              <p:cond delay="0"/>
+                            </p:stCondLst>
+                            <p:childTnLst>
+                              <p:par>
+                                <p:cTn id="21" presetID="1" presetClass="entr" presetSubtype="0" fill="hold" grpId="0" nodeType="clickEffect">
+                                  <p:stCondLst>
+                                    <p:cond delay="0"/>
+                                  </p:stCondLst>
+                                  <p:childTnLst>
+                                    <p:set>
+                                      <p:cBhvr>
+                                        <p:cTn id="22" dur="1" fill="hold">
                                           <p:stCondLst>
                                             <p:cond delay="0"/>
                                           </p:stCondLst>
@@ -13716,7 +13765,7 @@
               </a:buClr>
             </a:pPr>
             <a:r>
-              <a:rPr lang="bg-BG" sz="3200"/>
+              <a:rPr lang="bg-BG" sz="3200" dirty="0"/>
               <a:t>Класовете се именуват със съществителни имена, използвайки </a:t>
             </a:r>
             <a:r>
@@ -13738,11 +13787,11 @@
               </a:buClr>
             </a:pPr>
             <a:r>
-              <a:rPr lang="bg-BG" sz="3200"/>
+              <a:rPr lang="bg-BG" sz="3200" dirty="0"/>
               <a:t>Използвайте</a:t>
             </a:r>
             <a:r>
-              <a:rPr lang="en-US" sz="3200">
+              <a:rPr lang="en-US" sz="3200" dirty="0">
                 <a:solidFill>
                   <a:schemeClr val="tx1">
                     <a:lumMod val="75000"/>
@@ -13752,7 +13801,7 @@
               <a:t> </a:t>
             </a:r>
             <a:r>
-              <a:rPr lang="bg-BG" sz="3200" b="1">
+              <a:rPr lang="bg-BG" sz="3200" b="1" dirty="0">
                 <a:solidFill>
                   <a:schemeClr val="bg1"/>
                 </a:solidFill>
@@ -13760,7 +13809,7 @@
               <a:t>описателни</a:t>
             </a:r>
             <a:r>
-              <a:rPr lang="en-US" sz="3200" b="1">
+              <a:rPr lang="en-US" sz="3200" b="1" dirty="0">
                 <a:solidFill>
                   <a:schemeClr val="bg1"/>
                 </a:solidFill>
@@ -13768,14 +13817,14 @@
               <a:t> </a:t>
             </a:r>
             <a:r>
-              <a:rPr lang="bg-BG" sz="3200" b="1">
+              <a:rPr lang="bg-BG" sz="3200" b="1" dirty="0">
                 <a:solidFill>
                   <a:schemeClr val="bg1"/>
                 </a:solidFill>
               </a:rPr>
               <a:t>съществителни имена</a:t>
             </a:r>
-            <a:endParaRPr lang="en-US" sz="3200" b="1">
+            <a:endParaRPr lang="en-US" sz="3200" b="1" dirty="0">
               <a:solidFill>
                 <a:schemeClr val="bg1"/>
               </a:solidFill>
@@ -13791,7 +13840,7 @@
               </a:buClr>
             </a:pPr>
             <a:r>
-              <a:rPr lang="bg-BG" sz="3200" b="1">
+              <a:rPr lang="bg-BG" sz="3200" b="1" dirty="0">
                 <a:solidFill>
                   <a:schemeClr val="bg1"/>
                 </a:solidFill>
@@ -13799,15 +13848,15 @@
               <a:t>Избягвайте абревиатури </a:t>
             </a:r>
             <a:r>
-              <a:rPr lang="en-US" sz="3200"/>
+              <a:rPr lang="en-US" sz="3200" dirty="0"/>
               <a:t>(</a:t>
             </a:r>
             <a:r>
-              <a:rPr lang="bg-BG" sz="3200"/>
+              <a:rPr lang="bg-BG" sz="3200" dirty="0"/>
               <a:t>с изключение на по-известните като</a:t>
             </a:r>
             <a:r>
-              <a:rPr lang="en-US" sz="3200"/>
+              <a:rPr lang="en-US" sz="3200" dirty="0"/>
               <a:t> URL, HTTP, etc.)</a:t>
             </a:r>
           </a:p>
@@ -13998,7 +14047,7 @@
               </a:spcAft>
             </a:pPr>
             <a:r>
-              <a:rPr lang="en-US" sz="2799">
+              <a:rPr lang="en-US" sz="2799" dirty="0">
                 <a:solidFill>
                   <a:schemeClr val="tx1"/>
                 </a:solidFill>
@@ -14006,11 +14055,11 @@
               <a:t>class</a:t>
             </a:r>
             <a:r>
-              <a:rPr lang="en-US" sz="2799"/>
+              <a:rPr lang="en-US" sz="2799" dirty="0"/>
               <a:t> </a:t>
             </a:r>
             <a:r>
-              <a:rPr lang="en-US" sz="2799">
+              <a:rPr lang="en-US" sz="2799" dirty="0">
                 <a:solidFill>
                   <a:schemeClr val="bg1"/>
                 </a:solidFill>
@@ -14018,11 +14067,11 @@
               <a:t>Dice</a:t>
             </a:r>
             <a:r>
-              <a:rPr lang="en-US" sz="2799"/>
+              <a:rPr lang="en-US" sz="2799" dirty="0"/>
               <a:t> </a:t>
             </a:r>
             <a:r>
-              <a:rPr lang="en-US" sz="2799">
+              <a:rPr lang="en-US" sz="2799" dirty="0">
                 <a:solidFill>
                   <a:schemeClr val="tx1"/>
                 </a:solidFill>
@@ -14043,7 +14092,7 @@
               </a:spcAft>
             </a:pPr>
             <a:r>
-              <a:rPr lang="en-US" sz="2799">
+              <a:rPr lang="en-US" sz="2799" dirty="0">
                 <a:solidFill>
                   <a:schemeClr val="tx1"/>
                 </a:solidFill>
@@ -14051,11 +14100,11 @@
               <a:t>class</a:t>
             </a:r>
             <a:r>
-              <a:rPr lang="en-US" sz="2799"/>
+              <a:rPr lang="en-US" sz="2799" dirty="0"/>
               <a:t> </a:t>
             </a:r>
             <a:r>
-              <a:rPr lang="en-US" sz="2799">
+              <a:rPr lang="en-US" sz="2799" dirty="0" err="1">
                 <a:solidFill>
                   <a:schemeClr val="bg1"/>
                 </a:solidFill>
@@ -14063,11 +14112,11 @@
               <a:t>BankAccount</a:t>
             </a:r>
             <a:r>
-              <a:rPr lang="en-US" sz="2799"/>
+              <a:rPr lang="en-US" sz="2799" dirty="0"/>
               <a:t> </a:t>
             </a:r>
             <a:r>
-              <a:rPr lang="en-US" sz="2799">
+              <a:rPr lang="en-US" sz="2799" dirty="0">
                 <a:solidFill>
                   <a:schemeClr val="tx1"/>
                 </a:solidFill>
@@ -14360,66 +14409,6 @@
           </a:p>
         </p:txBody>
       </p:sp>
-      <p:pic>
-        <p:nvPicPr>
-          <p:cNvPr id="3" name="Picture 2"/>
-          <p:cNvPicPr>
-            <a:picLocks noChangeAspect="1"/>
-          </p:cNvPicPr>
-          <p:nvPr/>
-        </p:nvPicPr>
-        <p:blipFill>
-          <a:blip r:embed="rId3" cstate="print">
-            <a:extLst>
-              <a:ext uri="{28A0092B-C50C-407E-A947-70E740481C1C}">
-                <a14:useLocalDpi xmlns:a14="http://schemas.microsoft.com/office/drawing/2010/main" val="0"/>
-              </a:ext>
-            </a:extLst>
-          </a:blip>
-          <a:stretch>
-            <a:fillRect/>
-          </a:stretch>
-        </p:blipFill>
-        <p:spPr>
-          <a:xfrm>
-            <a:off x="8023505" y="4192637"/>
-            <a:ext cx="760126" cy="760126"/>
-          </a:xfrm>
-          <a:prstGeom prst="rect">
-            <a:avLst/>
-          </a:prstGeom>
-        </p:spPr>
-      </p:pic>
-      <p:pic>
-        <p:nvPicPr>
-          <p:cNvPr id="9" name="Picture 8"/>
-          <p:cNvPicPr>
-            <a:picLocks noChangeAspect="1"/>
-          </p:cNvPicPr>
-          <p:nvPr/>
-        </p:nvPicPr>
-        <p:blipFill>
-          <a:blip r:embed="rId4" cstate="print">
-            <a:extLst>
-              <a:ext uri="{28A0092B-C50C-407E-A947-70E740481C1C}">
-                <a14:useLocalDpi xmlns:a14="http://schemas.microsoft.com/office/drawing/2010/main" val="0"/>
-              </a:ext>
-            </a:extLst>
-          </a:blip>
-          <a:stretch>
-            <a:fillRect/>
-          </a:stretch>
-        </p:blipFill>
-        <p:spPr>
-          <a:xfrm>
-            <a:off x="8010866" y="5618991"/>
-            <a:ext cx="772765" cy="772765"/>
-          </a:xfrm>
-          <a:prstGeom prst="rect">
-            <a:avLst/>
-          </a:prstGeom>
-        </p:spPr>
-      </p:pic>
       <p:sp>
         <p:nvSpPr>
           <p:cNvPr id="11" name="Slide Number">
@@ -14682,6 +14671,116 @@
           </a:p>
         </p:txBody>
       </p:sp>
+      <p:pic>
+        <p:nvPicPr>
+          <p:cNvPr id="2" name="Picture 2" descr="haken, installed, ok, package, richtig, right, tick, updated icon">
+            <a:extLst>
+              <a:ext uri="{FF2B5EF4-FFF2-40B4-BE49-F238E27FC236}">
+                <a16:creationId xmlns:a16="http://schemas.microsoft.com/office/drawing/2014/main" id="{42314CAF-03A8-728F-E3C8-DB8559AB0464}"/>
+              </a:ext>
+            </a:extLst>
+          </p:cNvPr>
+          <p:cNvPicPr>
+            <a:picLocks noChangeAspect="1" noChangeArrowheads="1"/>
+          </p:cNvPicPr>
+          <p:nvPr/>
+        </p:nvPicPr>
+        <p:blipFill>
+          <a:blip r:embed="rId3">
+            <a:extLst>
+              <a:ext uri="{28A0092B-C50C-407E-A947-70E740481C1C}">
+                <a14:useLocalDpi xmlns:a14="http://schemas.microsoft.com/office/drawing/2010/main"/>
+              </a:ext>
+            </a:extLst>
+          </a:blip>
+          <a:srcRect/>
+          <a:stretch>
+            <a:fillRect/>
+          </a:stretch>
+        </p:blipFill>
+        <p:spPr bwMode="auto">
+          <a:xfrm>
+            <a:off x="7932033" y="4149880"/>
+            <a:ext cx="849000" cy="763264"/>
+          </a:xfrm>
+          <a:prstGeom prst="rect">
+            <a:avLst/>
+          </a:prstGeom>
+          <a:noFill/>
+          <a:effectLst>
+            <a:outerShdw blurRad="101600" sx="102000" sy="102000" algn="ctr" rotWithShape="0">
+              <a:schemeClr val="tx2">
+                <a:lumMod val="60000"/>
+                <a:lumOff val="40000"/>
+                <a:alpha val="70000"/>
+              </a:schemeClr>
+            </a:outerShdw>
+          </a:effectLst>
+          <a:extLst>
+            <a:ext uri="{909E8E84-426E-40DD-AFC4-6F175D3DCCD1}">
+              <a14:hiddenFill xmlns:a14="http://schemas.microsoft.com/office/drawing/2010/main">
+                <a:solidFill>
+                  <a:srgbClr val="FFFFFF"/>
+                </a:solidFill>
+              </a14:hiddenFill>
+            </a:ext>
+          </a:extLst>
+        </p:spPr>
+      </p:pic>
+      <p:pic>
+        <p:nvPicPr>
+          <p:cNvPr id="6" name="Picture 5" descr="approve, block, cancel, delete, reject icon">
+            <a:extLst>
+              <a:ext uri="{FF2B5EF4-FFF2-40B4-BE49-F238E27FC236}">
+                <a16:creationId xmlns:a16="http://schemas.microsoft.com/office/drawing/2014/main" id="{55A522E7-F7C2-FD22-0686-173CC2DE828A}"/>
+              </a:ext>
+            </a:extLst>
+          </p:cNvPr>
+          <p:cNvPicPr>
+            <a:picLocks noChangeAspect="1" noChangeArrowheads="1"/>
+          </p:cNvPicPr>
+          <p:nvPr/>
+        </p:nvPicPr>
+        <p:blipFill>
+          <a:blip r:embed="rId4" cstate="screen">
+            <a:extLst>
+              <a:ext uri="{28A0092B-C50C-407E-A947-70E740481C1C}">
+                <a14:useLocalDpi xmlns:a14="http://schemas.microsoft.com/office/drawing/2010/main"/>
+              </a:ext>
+            </a:extLst>
+          </a:blip>
+          <a:srcRect/>
+          <a:stretch>
+            <a:fillRect/>
+          </a:stretch>
+        </p:blipFill>
+        <p:spPr bwMode="auto">
+          <a:xfrm>
+            <a:off x="8000281" y="5639911"/>
+            <a:ext cx="712503" cy="705110"/>
+          </a:xfrm>
+          <a:prstGeom prst="rect">
+            <a:avLst/>
+          </a:prstGeom>
+          <a:noFill/>
+          <a:effectLst>
+            <a:outerShdw blurRad="101600" sx="102000" sy="102000" algn="ctr" rotWithShape="0">
+              <a:srgbClr val="FF3300">
+                <a:alpha val="69804"/>
+              </a:srgbClr>
+            </a:outerShdw>
+          </a:effectLst>
+          <a:extLst>
+            <a:ext uri="{909E8E84-426E-40DD-AFC4-6F175D3DCCD1}">
+              <a14:hiddenFill xmlns:a14="http://schemas.microsoft.com/office/drawing/2010/main">
+                <a:solidFill>
+                  <a:srgbClr val="FFFFFF"/>
+                </a:solidFill>
+              </a14:hiddenFill>
+            </a:ext>
+          </a:extLst>
+        </p:spPr>
+      </p:pic>
     </p:spTree>
     <p:extLst>
       <p:ext uri="{BB962C8B-B14F-4D97-AF65-F5344CB8AC3E}">
@@ -14859,7 +14958,7 @@
                                           </p:stCondLst>
                                         </p:cTn>
                                         <p:tgtEl>
-                                          <p:spTgt spid="3"/>
+                                          <p:spTgt spid="2"/>
                                         </p:tgtEl>
                                         <p:attrNameLst>
                                           <p:attrName>style.visibility</p:attrName>
@@ -14931,7 +15030,7 @@
                                           </p:stCondLst>
                                         </p:cTn>
                                         <p:tgtEl>
-                                          <p:spTgt spid="9"/>
+                                          <p:spTgt spid="6"/>
                                         </p:tgtEl>
                                         <p:attrNameLst>
                                           <p:attrName>style.visibility</p:attrName>
@@ -15023,7 +15122,7 @@
               </a:buClr>
             </a:pPr>
             <a:r>
-              <a:rPr lang="bg-BG" sz="3599" b="1">
+              <a:rPr lang="bg-BG" sz="3599" b="1" dirty="0">
                 <a:solidFill>
                   <a:schemeClr val="bg1"/>
                 </a:solidFill>
@@ -15031,19 +15130,19 @@
               <a:t>Членовете</a:t>
             </a:r>
             <a:r>
-              <a:rPr lang="en-US" sz="3599"/>
+              <a:rPr lang="en-US" sz="3599" dirty="0"/>
               <a:t> </a:t>
             </a:r>
             <a:r>
-              <a:rPr lang="bg-BG" sz="3599"/>
+              <a:rPr lang="bg-BG" sz="3599" dirty="0"/>
               <a:t>се</a:t>
             </a:r>
             <a:r>
-              <a:rPr lang="en-US" sz="3599"/>
+              <a:rPr lang="en-US" sz="3599" dirty="0"/>
               <a:t> </a:t>
             </a:r>
             <a:r>
-              <a:rPr lang="bg-BG" sz="3599" b="1">
+              <a:rPr lang="bg-BG" sz="3599" b="1" dirty="0">
                 <a:solidFill>
                   <a:schemeClr val="bg1"/>
                 </a:solidFill>
@@ -15051,14 +15150,14 @@
               <a:t>декларират</a:t>
             </a:r>
             <a:r>
-              <a:rPr lang="en-US" sz="3599"/>
+              <a:rPr lang="en-US" sz="3599" dirty="0"/>
               <a:t> </a:t>
             </a:r>
             <a:r>
-              <a:rPr lang="bg-BG" sz="3599"/>
+              <a:rPr lang="bg-BG" sz="3599" dirty="0"/>
               <a:t>вътре в класа</a:t>
             </a:r>
-            <a:endParaRPr lang="bg-BG" sz="3599" b="1"/>
+            <a:endParaRPr lang="bg-BG" sz="3599" b="1" dirty="0"/>
           </a:p>
           <a:p>
             <a:pPr>
@@ -15067,11 +15166,11 @@
               </a:buClr>
             </a:pPr>
             <a:r>
-              <a:rPr lang="bg-BG" sz="3599"/>
+              <a:rPr lang="bg-BG" sz="3599" dirty="0"/>
               <a:t>Членовете могат да бъдат</a:t>
             </a:r>
             <a:r>
-              <a:rPr lang="en-GB" sz="3599"/>
+              <a:rPr lang="en-GB" sz="3599" dirty="0"/>
               <a:t>:</a:t>
             </a:r>
           </a:p>
@@ -15082,7 +15181,7 @@
               </a:buClr>
             </a:pPr>
             <a:r>
-              <a:rPr lang="bg-BG" sz="3399" b="1">
+              <a:rPr lang="bg-BG" sz="3399" b="1" dirty="0">
                 <a:solidFill>
                   <a:schemeClr val="bg1"/>
                 </a:solidFill>
@@ -15090,15 +15189,15 @@
               <a:t>Полета</a:t>
             </a:r>
             <a:r>
-              <a:rPr lang="en-GB" sz="3399"/>
+              <a:rPr lang="en-GB" sz="3399" dirty="0"/>
               <a:t> (</a:t>
             </a:r>
             <a:r>
-              <a:rPr lang="bg-BG" sz="3399"/>
+              <a:rPr lang="bg-BG" sz="3399" dirty="0"/>
               <a:t>данни</a:t>
             </a:r>
             <a:r>
-              <a:rPr lang="en-GB" sz="3399"/>
+              <a:rPr lang="en-GB" sz="3399" dirty="0"/>
               <a:t>)</a:t>
             </a:r>
           </a:p>
@@ -15109,7 +15208,7 @@
               </a:buClr>
             </a:pPr>
             <a:r>
-              <a:rPr lang="bg-BG" sz="3399" b="1">
+              <a:rPr lang="bg-BG" sz="3399" b="1" dirty="0">
                 <a:solidFill>
                   <a:schemeClr val="bg1"/>
                 </a:solidFill>
@@ -15117,26 +15216,26 @@
               <a:t>Свойства</a:t>
             </a:r>
             <a:br>
-              <a:rPr lang="en-GB" sz="3399"/>
+              <a:rPr lang="en-GB" sz="3399" dirty="0"/>
             </a:br>
             <a:r>
-              <a:rPr lang="en-GB" sz="3399"/>
+              <a:rPr lang="en-GB" sz="3399" dirty="0"/>
               <a:t>(</a:t>
             </a:r>
             <a:r>
-              <a:rPr lang="bg-BG" sz="3399"/>
+              <a:rPr lang="bg-BG" sz="3399" dirty="0"/>
               <a:t>данни</a:t>
             </a:r>
             <a:r>
-              <a:rPr lang="en-GB" sz="3399"/>
+              <a:rPr lang="en-GB" sz="3399" dirty="0"/>
               <a:t> + </a:t>
             </a:r>
             <a:r>
-              <a:rPr lang="bg-BG" sz="3399"/>
+              <a:rPr lang="bg-BG" sz="3399" dirty="0"/>
               <a:t>логика</a:t>
             </a:r>
             <a:r>
-              <a:rPr lang="en-GB" sz="3399"/>
+              <a:rPr lang="en-GB" sz="3399" dirty="0"/>
               <a:t>)</a:t>
             </a:r>
           </a:p>
@@ -15147,7 +15246,7 @@
               </a:buClr>
             </a:pPr>
             <a:r>
-              <a:rPr lang="bg-BG" sz="3399" b="1">
+              <a:rPr lang="bg-BG" sz="3399" b="1" dirty="0">
                 <a:solidFill>
                   <a:schemeClr val="bg1"/>
                 </a:solidFill>
@@ -15155,15 +15254,15 @@
               <a:t>Методи</a:t>
             </a:r>
             <a:r>
-              <a:rPr lang="en-GB" sz="3399"/>
+              <a:rPr lang="en-GB" sz="3399" dirty="0"/>
               <a:t> (</a:t>
             </a:r>
             <a:r>
-              <a:rPr lang="bg-BG" sz="3399"/>
+              <a:rPr lang="bg-BG" sz="3399" dirty="0"/>
               <a:t>действия</a:t>
             </a:r>
             <a:r>
-              <a:rPr lang="en-GB" sz="3399"/>
+              <a:rPr lang="en-GB" sz="3399" dirty="0"/>
               <a:t>)</a:t>
             </a:r>
           </a:p>
@@ -15174,14 +15273,14 @@
               </a:buClr>
             </a:pPr>
             <a:r>
-              <a:rPr lang="bg-BG" sz="3399" b="1">
+              <a:rPr lang="bg-BG" sz="3399" b="1" dirty="0">
                 <a:solidFill>
                   <a:schemeClr val="bg1"/>
                 </a:solidFill>
               </a:rPr>
               <a:t>Конструктори</a:t>
             </a:r>
-            <a:endParaRPr lang="en-GB" sz="3399" b="1">
+            <a:endParaRPr lang="en-GB" sz="3399" b="1" dirty="0">
               <a:solidFill>
                 <a:schemeClr val="bg1"/>
               </a:solidFill>
@@ -15194,10 +15293,10 @@
               </a:buClr>
             </a:pPr>
             <a:r>
-              <a:rPr lang="bg-BG" sz="3399"/>
+              <a:rPr lang="bg-BG" sz="3399" dirty="0"/>
               <a:t>Други</a:t>
             </a:r>
-            <a:endParaRPr lang="en-US"/>
+            <a:endParaRPr lang="en-US" dirty="0"/>
           </a:p>
         </p:txBody>
       </p:sp>
@@ -15764,7 +15863,7 @@
           <a:p>
             <a:pPr algn="ctr" eaLnBrk="0" hangingPunct="0"/>
             <a:r>
-              <a:rPr lang="bg-BG" sz="2399" b="1">
+              <a:rPr lang="bg-BG" sz="2399" b="1" dirty="0">
                 <a:solidFill>
                   <a:schemeClr val="bg2"/>
                 </a:solidFill>
@@ -16056,7 +16155,7 @@
                             </p:stCondLst>
                             <p:childTnLst>
                               <p:par>
-                                <p:cTn id="5" presetID="1" presetClass="entr" presetSubtype="0" fill="hold" grpId="0" nodeType="clickEffect">
+                                <p:cTn id="5" presetID="1" presetClass="entr" presetSubtype="0" fill="hold" nodeType="clickEffect">
                                   <p:stCondLst>
                                     <p:cond delay="0"/>
                                   </p:stCondLst>
@@ -16069,7 +16168,11 @@
                                           </p:stCondLst>
                                         </p:cTn>
                                         <p:tgtEl>
-                                          <p:spTgt spid="8"/>
+                                          <p:spTgt spid="11">
+                                            <p:txEl>
+                                              <p:pRg st="1" end="1"/>
+                                            </p:txEl>
+                                          </p:spTgt>
                                         </p:tgtEl>
                                         <p:attrNameLst>
                                           <p:attrName>style.visibility</p:attrName>
@@ -16101,7 +16204,7 @@
                             </p:stCondLst>
                             <p:childTnLst>
                               <p:par>
-                                <p:cTn id="9" presetID="1" presetClass="entr" presetSubtype="0" fill="hold" grpId="0" nodeType="clickEffect">
+                                <p:cTn id="9" presetID="1" presetClass="entr" presetSubtype="0" fill="hold" nodeType="clickEffect">
                                   <p:stCondLst>
                                     <p:cond delay="0"/>
                                   </p:stCondLst>
@@ -16114,7 +16217,11 @@
                                           </p:stCondLst>
                                         </p:cTn>
                                         <p:tgtEl>
-                                          <p:spTgt spid="9"/>
+                                          <p:spTgt spid="11">
+                                            <p:txEl>
+                                              <p:pRg st="2" end="2"/>
+                                            </p:txEl>
+                                          </p:spTgt>
                                         </p:tgtEl>
                                         <p:attrNameLst>
                                           <p:attrName>style.visibility</p:attrName>
@@ -16146,7 +16253,7 @@
                             </p:stCondLst>
                             <p:childTnLst>
                               <p:par>
-                                <p:cTn id="13" presetID="1" presetClass="entr" presetSubtype="0" fill="hold" grpId="0" nodeType="clickEffect">
+                                <p:cTn id="13" presetID="1" presetClass="entr" presetSubtype="0" fill="hold" nodeType="clickEffect">
                                   <p:stCondLst>
                                     <p:cond delay="0"/>
                                   </p:stCondLst>
@@ -16159,7 +16266,11 @@
                                           </p:stCondLst>
                                         </p:cTn>
                                         <p:tgtEl>
-                                          <p:spTgt spid="14"/>
+                                          <p:spTgt spid="11">
+                                            <p:txEl>
+                                              <p:pRg st="3" end="3"/>
+                                            </p:txEl>
+                                          </p:spTgt>
                                         </p:tgtEl>
                                         <p:attrNameLst>
                                           <p:attrName>style.visibility</p:attrName>
@@ -16191,7 +16302,7 @@
                             </p:stCondLst>
                             <p:childTnLst>
                               <p:par>
-                                <p:cTn id="17" presetID="1" presetClass="entr" presetSubtype="0" fill="hold" grpId="0" nodeType="clickEffect">
+                                <p:cTn id="17" presetID="1" presetClass="entr" presetSubtype="0" fill="hold" nodeType="clickEffect">
                                   <p:stCondLst>
                                     <p:cond delay="0"/>
                                   </p:stCondLst>
@@ -16199,6 +16310,234 @@
                                     <p:set>
                                       <p:cBhvr>
                                         <p:cTn id="18" dur="1" fill="hold">
+                                          <p:stCondLst>
+                                            <p:cond delay="0"/>
+                                          </p:stCondLst>
+                                        </p:cTn>
+                                        <p:tgtEl>
+                                          <p:spTgt spid="11">
+                                            <p:txEl>
+                                              <p:pRg st="4" end="4"/>
+                                            </p:txEl>
+                                          </p:spTgt>
+                                        </p:tgtEl>
+                                        <p:attrNameLst>
+                                          <p:attrName>style.visibility</p:attrName>
+                                        </p:attrNameLst>
+                                      </p:cBhvr>
+                                      <p:to>
+                                        <p:strVal val="visible"/>
+                                      </p:to>
+                                    </p:set>
+                                  </p:childTnLst>
+                                </p:cTn>
+                              </p:par>
+                            </p:childTnLst>
+                          </p:cTn>
+                        </p:par>
+                      </p:childTnLst>
+                    </p:cTn>
+                  </p:par>
+                  <p:par>
+                    <p:cTn id="19" fill="hold">
+                      <p:stCondLst>
+                        <p:cond delay="indefinite"/>
+                      </p:stCondLst>
+                      <p:childTnLst>
+                        <p:par>
+                          <p:cTn id="20" fill="hold">
+                            <p:stCondLst>
+                              <p:cond delay="0"/>
+                            </p:stCondLst>
+                            <p:childTnLst>
+                              <p:par>
+                                <p:cTn id="21" presetID="1" presetClass="entr" presetSubtype="0" fill="hold" nodeType="clickEffect">
+                                  <p:stCondLst>
+                                    <p:cond delay="0"/>
+                                  </p:stCondLst>
+                                  <p:childTnLst>
+                                    <p:set>
+                                      <p:cBhvr>
+                                        <p:cTn id="22" dur="1" fill="hold">
+                                          <p:stCondLst>
+                                            <p:cond delay="0"/>
+                                          </p:stCondLst>
+                                        </p:cTn>
+                                        <p:tgtEl>
+                                          <p:spTgt spid="11">
+                                            <p:txEl>
+                                              <p:pRg st="5" end="5"/>
+                                            </p:txEl>
+                                          </p:spTgt>
+                                        </p:tgtEl>
+                                        <p:attrNameLst>
+                                          <p:attrName>style.visibility</p:attrName>
+                                        </p:attrNameLst>
+                                      </p:cBhvr>
+                                      <p:to>
+                                        <p:strVal val="visible"/>
+                                      </p:to>
+                                    </p:set>
+                                  </p:childTnLst>
+                                </p:cTn>
+                              </p:par>
+                            </p:childTnLst>
+                          </p:cTn>
+                        </p:par>
+                      </p:childTnLst>
+                    </p:cTn>
+                  </p:par>
+                  <p:par>
+                    <p:cTn id="23" fill="hold">
+                      <p:stCondLst>
+                        <p:cond delay="indefinite"/>
+                      </p:stCondLst>
+                      <p:childTnLst>
+                        <p:par>
+                          <p:cTn id="24" fill="hold">
+                            <p:stCondLst>
+                              <p:cond delay="0"/>
+                            </p:stCondLst>
+                            <p:childTnLst>
+                              <p:par>
+                                <p:cTn id="25" presetID="1" presetClass="entr" presetSubtype="0" fill="hold" nodeType="clickEffect">
+                                  <p:stCondLst>
+                                    <p:cond delay="0"/>
+                                  </p:stCondLst>
+                                  <p:childTnLst>
+                                    <p:set>
+                                      <p:cBhvr>
+                                        <p:cTn id="26" dur="1" fill="hold">
+                                          <p:stCondLst>
+                                            <p:cond delay="0"/>
+                                          </p:stCondLst>
+                                        </p:cTn>
+                                        <p:tgtEl>
+                                          <p:spTgt spid="11">
+                                            <p:txEl>
+                                              <p:pRg st="6" end="6"/>
+                                            </p:txEl>
+                                          </p:spTgt>
+                                        </p:tgtEl>
+                                        <p:attrNameLst>
+                                          <p:attrName>style.visibility</p:attrName>
+                                        </p:attrNameLst>
+                                      </p:cBhvr>
+                                      <p:to>
+                                        <p:strVal val="visible"/>
+                                      </p:to>
+                                    </p:set>
+                                  </p:childTnLst>
+                                </p:cTn>
+                              </p:par>
+                            </p:childTnLst>
+                          </p:cTn>
+                        </p:par>
+                      </p:childTnLst>
+                    </p:cTn>
+                  </p:par>
+                  <p:par>
+                    <p:cTn id="27" fill="hold">
+                      <p:stCondLst>
+                        <p:cond delay="indefinite"/>
+                      </p:stCondLst>
+                      <p:childTnLst>
+                        <p:par>
+                          <p:cTn id="28" fill="hold">
+                            <p:stCondLst>
+                              <p:cond delay="0"/>
+                            </p:stCondLst>
+                            <p:childTnLst>
+                              <p:par>
+                                <p:cTn id="29" presetID="1" presetClass="entr" presetSubtype="0" fill="hold" grpId="0" nodeType="clickEffect">
+                                  <p:stCondLst>
+                                    <p:cond delay="0"/>
+                                  </p:stCondLst>
+                                  <p:childTnLst>
+                                    <p:set>
+                                      <p:cBhvr>
+                                        <p:cTn id="30" dur="1" fill="hold">
+                                          <p:stCondLst>
+                                            <p:cond delay="0"/>
+                                          </p:stCondLst>
+                                        </p:cTn>
+                                        <p:tgtEl>
+                                          <p:spTgt spid="8"/>
+                                        </p:tgtEl>
+                                        <p:attrNameLst>
+                                          <p:attrName>style.visibility</p:attrName>
+                                        </p:attrNameLst>
+                                      </p:cBhvr>
+                                      <p:to>
+                                        <p:strVal val="visible"/>
+                                      </p:to>
+                                    </p:set>
+                                  </p:childTnLst>
+                                </p:cTn>
+                              </p:par>
+                              <p:par>
+                                <p:cTn id="31" presetID="1" presetClass="entr" presetSubtype="0" fill="hold" grpId="0" nodeType="withEffect">
+                                  <p:stCondLst>
+                                    <p:cond delay="0"/>
+                                  </p:stCondLst>
+                                  <p:childTnLst>
+                                    <p:set>
+                                      <p:cBhvr>
+                                        <p:cTn id="32" dur="1" fill="hold">
+                                          <p:stCondLst>
+                                            <p:cond delay="0"/>
+                                          </p:stCondLst>
+                                        </p:cTn>
+                                        <p:tgtEl>
+                                          <p:spTgt spid="9"/>
+                                        </p:tgtEl>
+                                        <p:attrNameLst>
+                                          <p:attrName>style.visibility</p:attrName>
+                                        </p:attrNameLst>
+                                      </p:cBhvr>
+                                      <p:to>
+                                        <p:strVal val="visible"/>
+                                      </p:to>
+                                    </p:set>
+                                  </p:childTnLst>
+                                </p:cTn>
+                              </p:par>
+                              <p:par>
+                                <p:cTn id="33" presetID="1" presetClass="entr" presetSubtype="0" fill="hold" grpId="0" nodeType="withEffect">
+                                  <p:stCondLst>
+                                    <p:cond delay="0"/>
+                                  </p:stCondLst>
+                                  <p:childTnLst>
+                                    <p:set>
+                                      <p:cBhvr>
+                                        <p:cTn id="34" dur="1" fill="hold">
+                                          <p:stCondLst>
+                                            <p:cond delay="0"/>
+                                          </p:stCondLst>
+                                        </p:cTn>
+                                        <p:tgtEl>
+                                          <p:spTgt spid="14"/>
+                                        </p:tgtEl>
+                                        <p:attrNameLst>
+                                          <p:attrName>style.visibility</p:attrName>
+                                        </p:attrNameLst>
+                                      </p:cBhvr>
+                                      <p:to>
+                                        <p:strVal val="visible"/>
+                                      </p:to>
+                                    </p:set>
+                                  </p:childTnLst>
+                                </p:cTn>
+                              </p:par>
+                              <p:par>
+                                <p:cTn id="35" presetID="1" presetClass="entr" presetSubtype="0" fill="hold" grpId="0" nodeType="withEffect">
+                                  <p:stCondLst>
+                                    <p:cond delay="0"/>
+                                  </p:stCondLst>
+                                  <p:childTnLst>
+                                    <p:set>
+                                      <p:cBhvr>
+                                        <p:cTn id="36" dur="1" fill="hold">
                                           <p:stCondLst>
                                             <p:cond delay="0"/>
                                           </p:stCondLst>
@@ -16287,21 +16626,26 @@
             <p:ph type="body" sz="quarter" idx="10"/>
           </p:nvPr>
         </p:nvSpPr>
-        <p:spPr/>
+        <p:spPr>
+          <a:xfrm>
+            <a:off x="190402" y="1230234"/>
+            <a:ext cx="11818096" cy="5528766"/>
+          </a:xfrm>
+        </p:spPr>
         <p:txBody>
           <a:bodyPr/>
           <a:lstStyle/>
           <a:p>
             <a:r>
-              <a:rPr lang="bg-BG"/>
+              <a:rPr lang="bg-BG" dirty="0"/>
               <a:t>Класът</a:t>
             </a:r>
             <a:r>
-              <a:rPr lang="en-US"/>
+              <a:rPr lang="en-US" dirty="0"/>
               <a:t> </a:t>
             </a:r>
             <a:r>
-              <a:rPr lang="en-US" b="1">
+              <a:rPr lang="en-US" b="1" dirty="0">
                 <a:solidFill>
                   <a:schemeClr val="bg1"/>
                 </a:solidFill>
@@ -16310,19 +16654,19 @@
               <a:t>Rectangle</a:t>
             </a:r>
             <a:r>
-              <a:rPr lang="en-US"/>
+              <a:rPr lang="en-US" dirty="0"/>
               <a:t> </a:t>
             </a:r>
             <a:r>
-              <a:rPr lang="bg-BG"/>
+              <a:rPr lang="bg-BG" dirty="0"/>
               <a:t>съдържа свойствата</a:t>
             </a:r>
             <a:r>
-              <a:rPr lang="en-US"/>
+              <a:rPr lang="en-US" dirty="0"/>
               <a:t> </a:t>
             </a:r>
             <a:r>
-              <a:rPr lang="en-US" b="1">
+              <a:rPr lang="en-US" b="1" dirty="0">
                 <a:solidFill>
                   <a:schemeClr val="bg1"/>
                 </a:solidFill>
@@ -16331,11 +16675,11 @@
               <a:t>Width</a:t>
             </a:r>
             <a:r>
-              <a:rPr lang="en-US"/>
+              <a:rPr lang="en-US" dirty="0"/>
               <a:t> and </a:t>
             </a:r>
             <a:r>
-              <a:rPr lang="en-US" b="1">
+              <a:rPr lang="en-US" b="1" dirty="0">
                 <a:solidFill>
                   <a:schemeClr val="bg1"/>
                 </a:solidFill>
@@ -23498,10 +23842,10 @@
               </a:buClr>
             </a:pPr>
             <a:r>
-              <a:rPr lang="bg-BG" sz="4000"/>
+              <a:rPr lang="bg-BG" sz="4000" dirty="0"/>
               <a:t>Обекти и класове</a:t>
             </a:r>
-            <a:endParaRPr lang="en-GB" sz="4000"/>
+            <a:endParaRPr lang="en-GB" sz="4000" dirty="0"/>
           </a:p>
           <a:p>
             <a:pPr marL="514196" indent="-514196">
@@ -23513,10 +23857,10 @@
               </a:spcBef>
             </a:pPr>
             <a:r>
-              <a:rPr lang="bg-BG" sz="4000"/>
+              <a:rPr lang="bg-BG" sz="4000" dirty="0"/>
               <a:t>Дефиниране на прости класове</a:t>
             </a:r>
-            <a:endParaRPr lang="en-US" sz="4000"/>
+            <a:endParaRPr lang="en-US" sz="4000" dirty="0"/>
           </a:p>
           <a:p>
             <a:pPr>
@@ -23525,10 +23869,10 @@
               </a:buClr>
             </a:pPr>
             <a:r>
-              <a:rPr lang="bg-BG" sz="4000"/>
+              <a:rPr lang="bg-BG" sz="4000" dirty="0"/>
               <a:t>Полета и свойства</a:t>
             </a:r>
-            <a:endParaRPr lang="en-GB" sz="4000"/>
+            <a:endParaRPr lang="en-GB" sz="4000" dirty="0"/>
           </a:p>
           <a:p>
             <a:pPr>
@@ -23537,10 +23881,10 @@
               </a:buClr>
             </a:pPr>
             <a:r>
-              <a:rPr lang="bg-BG" sz="4000"/>
+              <a:rPr lang="bg-BG" sz="4000" dirty="0"/>
               <a:t>Методи</a:t>
             </a:r>
-            <a:endParaRPr lang="en-US" sz="4000"/>
+            <a:endParaRPr lang="en-US" sz="4000" dirty="0"/>
           </a:p>
           <a:p>
             <a:pPr>
@@ -23549,10 +23893,10 @@
               </a:buClr>
             </a:pPr>
             <a:r>
-              <a:rPr lang="bg-BG" sz="4000"/>
+              <a:rPr lang="bg-BG" sz="4000" dirty="0"/>
               <a:t>Конструктори</a:t>
             </a:r>
-            <a:endParaRPr lang="en-US" sz="4000"/>
+            <a:endParaRPr lang="en-US" sz="4000" dirty="0"/>
           </a:p>
         </p:txBody>
       </p:sp>
@@ -23769,7 +24113,7 @@
                                         <p:tgtEl>
                                           <p:spTgt spid="3">
                                             <p:txEl>
-                                              <p:pRg st="2" end="2"/>
+                                              <p:pRg st="1" end="1"/>
                                             </p:txEl>
                                           </p:spTgt>
                                         </p:tgtEl>
@@ -23818,7 +24162,7 @@
                                         <p:tgtEl>
                                           <p:spTgt spid="3">
                                             <p:txEl>
-                                              <p:pRg st="3" end="3"/>
+                                              <p:pRg st="2" end="2"/>
                                             </p:txEl>
                                           </p:spTgt>
                                         </p:tgtEl>
@@ -23860,6 +24204,55 @@
                                     <p:set>
                                       <p:cBhvr>
                                         <p:cTn id="14" dur="1" fill="hold">
+                                          <p:stCondLst>
+                                            <p:cond delay="0"/>
+                                          </p:stCondLst>
+                                        </p:cTn>
+                                        <p:tgtEl>
+                                          <p:spTgt spid="3">
+                                            <p:txEl>
+                                              <p:pRg st="3" end="3"/>
+                                            </p:txEl>
+                                          </p:spTgt>
+                                        </p:tgtEl>
+                                        <p:attrNameLst>
+                                          <p:attrName>style.visibility</p:attrName>
+                                        </p:attrNameLst>
+                                      </p:cBhvr>
+                                      <p:to>
+                                        <p:strVal val="visible"/>
+                                      </p:to>
+                                    </p:set>
+                                  </p:childTnLst>
+                                </p:cTn>
+                              </p:par>
+                            </p:childTnLst>
+                          </p:cTn>
+                        </p:par>
+                      </p:childTnLst>
+                    </p:cTn>
+                  </p:par>
+                  <p:par>
+                    <p:cTn id="15" fill="hold">
+                      <p:stCondLst>
+                        <p:cond delay="indefinite"/>
+                      </p:stCondLst>
+                      <p:childTnLst>
+                        <p:par>
+                          <p:cTn id="16" fill="hold">
+                            <p:stCondLst>
+                              <p:cond delay="0"/>
+                            </p:stCondLst>
+                            <p:childTnLst>
+                              <p:par>
+                                <p:cTn id="17" presetID="1" presetClass="entr" presetSubtype="0" fill="hold" nodeType="clickEffect">
+                                  <p:stCondLst>
+                                    <p:cond delay="0"/>
+                                  </p:stCondLst>
+                                  <p:childTnLst>
+                                    <p:set>
+                                      <p:cBhvr>
+                                        <p:cTn id="18" dur="1" fill="hold">
                                           <p:stCondLst>
                                             <p:cond delay="0"/>
                                           </p:stCondLst>
@@ -24580,11 +24973,11 @@
               <a:t>Полетата могат да бъдат от </a:t>
             </a:r>
             <a:r>
-              <a:rPr lang="bg-BG" sz="2400" b="1" noProof="1">
+              <a:rPr lang="bg-BG" sz="2400" b="1" dirty="0">
                 <a:solidFill>
                   <a:schemeClr val="bg1">
-                    <a:lumMod val="60000"/>
-                    <a:lumOff val="40000"/>
+                    <a:lumMod val="40000"/>
+                    <a:lumOff val="60000"/>
                   </a:schemeClr>
                 </a:solidFill>
               </a:rPr>
@@ -24740,7 +25133,7 @@
           <a:p>
             <a:pPr algn="ctr" eaLnBrk="0" hangingPunct="0"/>
             <a:r>
-              <a:rPr lang="bg-BG" sz="2400" b="1">
+              <a:rPr lang="bg-BG" sz="2400" b="1" dirty="0">
                 <a:solidFill>
                   <a:schemeClr val="bg1">
                     <a:lumMod val="40000"/>
@@ -24751,7 +25144,7 @@
               <a:t>Полетата</a:t>
             </a:r>
             <a:r>
-              <a:rPr lang="en-US" sz="2400" b="1">
+              <a:rPr lang="en-US" sz="2400" b="1" dirty="0">
                 <a:solidFill>
                   <a:schemeClr val="bg2"/>
                 </a:solidFill>
@@ -24759,7 +25152,7 @@
               <a:t> </a:t>
             </a:r>
             <a:r>
-              <a:rPr lang="bg-BG" sz="2400" b="1">
+              <a:rPr lang="bg-BG" sz="2400" b="1" dirty="0">
                 <a:solidFill>
                   <a:schemeClr val="bg2"/>
                 </a:solidFill>
@@ -43289,6 +43682,11 @@
               </a:rPr>
               <a:t>{</a:t>
             </a:r>
+            <a:endParaRPr lang="bg-BG" sz="2400" dirty="0">
+              <a:solidFill>
+                <a:schemeClr val="tx1"/>
+              </a:solidFill>
+            </a:endParaRPr>
           </a:p>
           <a:p>
             <a:pPr>
@@ -43300,7 +43698,7 @@
               </a:spcAft>
             </a:pPr>
             <a:r>
-              <a:rPr lang="en-US" sz="2400" dirty="0">
+              <a:rPr lang="bg-BG" sz="2400" dirty="0">
                 <a:solidFill>
                   <a:schemeClr val="tx1"/>
                 </a:solidFill>
@@ -43807,7 +44205,7 @@
                                         <p:tgtEl>
                                           <p:spTgt spid="9">
                                             <p:txEl>
-                                              <p:pRg st="4" end="4"/>
+                                              <p:pRg st="2" end="2"/>
                                             </p:txEl>
                                           </p:spTgt>
                                         </p:tgtEl>
@@ -43856,7 +44254,7 @@
                                         <p:tgtEl>
                                           <p:spTgt spid="9">
                                             <p:txEl>
-                                              <p:pRg st="5" end="5"/>
+                                              <p:pRg st="3" end="3"/>
                                             </p:txEl>
                                           </p:spTgt>
                                         </p:tgtEl>
@@ -43905,7 +44303,7 @@
                                         <p:tgtEl>
                                           <p:spTgt spid="9">
                                             <p:txEl>
-                                              <p:pRg st="6" end="6"/>
+                                              <p:pRg st="4" end="4"/>
                                             </p:txEl>
                                           </p:spTgt>
                                         </p:tgtEl>
@@ -43920,26 +44318,39 @@
                                   </p:childTnLst>
                                 </p:cTn>
                               </p:par>
-                            </p:childTnLst>
-                          </p:cTn>
-                        </p:par>
-                      </p:childTnLst>
-                    </p:cTn>
-                  </p:par>
-                  <p:par>
-                    <p:cTn id="19" fill="hold">
-                      <p:stCondLst>
-                        <p:cond delay="indefinite"/>
-                      </p:stCondLst>
-                      <p:childTnLst>
-                        <p:par>
-                          <p:cTn id="20" fill="hold">
-                            <p:stCondLst>
-                              <p:cond delay="0"/>
-                            </p:stCondLst>
-                            <p:childTnLst>
                               <p:par>
-                                <p:cTn id="21" presetID="1" presetClass="entr" presetSubtype="0" fill="hold" nodeType="clickEffect">
+                                <p:cTn id="19" presetID="1" presetClass="entr" presetSubtype="0" fill="hold" nodeType="withEffect">
+                                  <p:stCondLst>
+                                    <p:cond delay="0"/>
+                                  </p:stCondLst>
+                                  <p:childTnLst>
+                                    <p:set>
+                                      <p:cBhvr>
+                                        <p:cTn id="20" dur="1" fill="hold">
+                                          <p:stCondLst>
+                                            <p:cond delay="0"/>
+                                          </p:stCondLst>
+                                        </p:cTn>
+                                        <p:tgtEl>
+                                          <p:spTgt spid="9">
+                                            <p:txEl>
+                                              <p:pRg st="5" end="5"/>
+                                            </p:txEl>
+                                          </p:spTgt>
+                                        </p:tgtEl>
+                                        <p:attrNameLst>
+                                          <p:attrName>style.visibility</p:attrName>
+                                        </p:attrNameLst>
+                                      </p:cBhvr>
+                                      <p:to>
+                                        <p:strVal val="visible"/>
+                                      </p:to>
+                                    </p:set>
+                                  </p:childTnLst>
+                                </p:cTn>
+                              </p:par>
+                              <p:par>
+                                <p:cTn id="21" presetID="1" presetClass="entr" presetSubtype="0" fill="hold" nodeType="withEffect">
                                   <p:stCondLst>
                                     <p:cond delay="0"/>
                                   </p:stCondLst>
@@ -43954,7 +44365,7 @@
                                         <p:tgtEl>
                                           <p:spTgt spid="9">
                                             <p:txEl>
-                                              <p:pRg st="3" end="3"/>
+                                              <p:pRg st="10" end="10"/>
                                             </p:txEl>
                                           </p:spTgt>
                                         </p:tgtEl>
@@ -44003,7 +44414,7 @@
                                         <p:tgtEl>
                                           <p:spTgt spid="9">
                                             <p:txEl>
-                                              <p:pRg st="2" end="2"/>
+                                              <p:pRg st="6" end="6"/>
                                             </p:txEl>
                                           </p:spTgt>
                                         </p:tgtEl>
@@ -44097,37 +44508,6 @@
                                           <p:spTgt spid="9">
                                             <p:txEl>
                                               <p:pRg st="9" end="9"/>
-                                            </p:txEl>
-                                          </p:spTgt>
-                                        </p:tgtEl>
-                                        <p:attrNameLst>
-                                          <p:attrName>style.visibility</p:attrName>
-                                        </p:attrNameLst>
-                                      </p:cBhvr>
-                                      <p:to>
-                                        <p:strVal val="visible"/>
-                                      </p:to>
-                                    </p:set>
-                                  </p:childTnLst>
-                                </p:cTn>
-                              </p:par>
-                              <p:par>
-                                <p:cTn id="33" presetID="1" presetClass="entr" presetSubtype="0" fill="hold" nodeType="withEffect">
-                                  <p:stCondLst>
-                                    <p:cond delay="0"/>
-                                  </p:stCondLst>
-                                  <p:childTnLst>
-                                    <p:set>
-                                      <p:cBhvr>
-                                        <p:cTn id="34" dur="1" fill="hold">
-                                          <p:stCondLst>
-                                            <p:cond delay="0"/>
-                                          </p:stCondLst>
-                                        </p:cTn>
-                                        <p:tgtEl>
-                                          <p:spTgt spid="9">
-                                            <p:txEl>
-                                              <p:pRg st="10" end="10"/>
                                             </p:txEl>
                                           </p:spTgt>
                                         </p:tgtEl>
@@ -46041,7 +46421,7 @@
         </p:nvSpPr>
         <p:spPr>
           <a:xfrm>
-            <a:off x="424643" y="1245560"/>
+            <a:off x="464331" y="1277060"/>
             <a:ext cx="11263337" cy="5378440"/>
           </a:xfrm>
           <a:prstGeom prst="rect">
@@ -46337,6 +46717,215 @@
                                     <p:set>
                                       <p:cBhvr>
                                         <p:cTn id="6" dur="1" fill="hold">
+                                          <p:stCondLst>
+                                            <p:cond delay="0"/>
+                                          </p:stCondLst>
+                                        </p:cTn>
+                                        <p:tgtEl>
+                                          <p:spTgt spid="9">
+                                            <p:txEl>
+                                              <p:pRg st="1" end="1"/>
+                                            </p:txEl>
+                                          </p:spTgt>
+                                        </p:tgtEl>
+                                        <p:attrNameLst>
+                                          <p:attrName>style.visibility</p:attrName>
+                                        </p:attrNameLst>
+                                      </p:cBhvr>
+                                      <p:to>
+                                        <p:strVal val="visible"/>
+                                      </p:to>
+                                    </p:set>
+                                  </p:childTnLst>
+                                </p:cTn>
+                              </p:par>
+                            </p:childTnLst>
+                          </p:cTn>
+                        </p:par>
+                      </p:childTnLst>
+                    </p:cTn>
+                  </p:par>
+                  <p:par>
+                    <p:cTn id="7" fill="hold">
+                      <p:stCondLst>
+                        <p:cond delay="indefinite"/>
+                      </p:stCondLst>
+                      <p:childTnLst>
+                        <p:par>
+                          <p:cTn id="8" fill="hold">
+                            <p:stCondLst>
+                              <p:cond delay="0"/>
+                            </p:stCondLst>
+                            <p:childTnLst>
+                              <p:par>
+                                <p:cTn id="9" presetID="1" presetClass="entr" presetSubtype="0" fill="hold" nodeType="clickEffect">
+                                  <p:stCondLst>
+                                    <p:cond delay="0"/>
+                                  </p:stCondLst>
+                                  <p:childTnLst>
+                                    <p:set>
+                                      <p:cBhvr>
+                                        <p:cTn id="10" dur="1" fill="hold">
+                                          <p:stCondLst>
+                                            <p:cond delay="0"/>
+                                          </p:stCondLst>
+                                        </p:cTn>
+                                        <p:tgtEl>
+                                          <p:spTgt spid="9">
+                                            <p:txEl>
+                                              <p:pRg st="2" end="2"/>
+                                            </p:txEl>
+                                          </p:spTgt>
+                                        </p:tgtEl>
+                                        <p:attrNameLst>
+                                          <p:attrName>style.visibility</p:attrName>
+                                        </p:attrNameLst>
+                                      </p:cBhvr>
+                                      <p:to>
+                                        <p:strVal val="visible"/>
+                                      </p:to>
+                                    </p:set>
+                                  </p:childTnLst>
+                                </p:cTn>
+                              </p:par>
+                              <p:par>
+                                <p:cTn id="11" presetID="1" presetClass="entr" presetSubtype="0" fill="hold" nodeType="withEffect">
+                                  <p:stCondLst>
+                                    <p:cond delay="0"/>
+                                  </p:stCondLst>
+                                  <p:childTnLst>
+                                    <p:set>
+                                      <p:cBhvr>
+                                        <p:cTn id="12" dur="1" fill="hold">
+                                          <p:stCondLst>
+                                            <p:cond delay="0"/>
+                                          </p:stCondLst>
+                                        </p:cTn>
+                                        <p:tgtEl>
+                                          <p:spTgt spid="9">
+                                            <p:txEl>
+                                              <p:pRg st="3" end="3"/>
+                                            </p:txEl>
+                                          </p:spTgt>
+                                        </p:tgtEl>
+                                        <p:attrNameLst>
+                                          <p:attrName>style.visibility</p:attrName>
+                                        </p:attrNameLst>
+                                      </p:cBhvr>
+                                      <p:to>
+                                        <p:strVal val="visible"/>
+                                      </p:to>
+                                    </p:set>
+                                  </p:childTnLst>
+                                </p:cTn>
+                              </p:par>
+                              <p:par>
+                                <p:cTn id="13" presetID="1" presetClass="entr" presetSubtype="0" fill="hold" nodeType="withEffect">
+                                  <p:stCondLst>
+                                    <p:cond delay="0"/>
+                                  </p:stCondLst>
+                                  <p:childTnLst>
+                                    <p:set>
+                                      <p:cBhvr>
+                                        <p:cTn id="14" dur="1" fill="hold">
+                                          <p:stCondLst>
+                                            <p:cond delay="0"/>
+                                          </p:stCondLst>
+                                        </p:cTn>
+                                        <p:tgtEl>
+                                          <p:spTgt spid="9">
+                                            <p:txEl>
+                                              <p:pRg st="4" end="4"/>
+                                            </p:txEl>
+                                          </p:spTgt>
+                                        </p:tgtEl>
+                                        <p:attrNameLst>
+                                          <p:attrName>style.visibility</p:attrName>
+                                        </p:attrNameLst>
+                                      </p:cBhvr>
+                                      <p:to>
+                                        <p:strVal val="visible"/>
+                                      </p:to>
+                                    </p:set>
+                                  </p:childTnLst>
+                                </p:cTn>
+                              </p:par>
+                            </p:childTnLst>
+                          </p:cTn>
+                        </p:par>
+                      </p:childTnLst>
+                    </p:cTn>
+                  </p:par>
+                  <p:par>
+                    <p:cTn id="15" fill="hold">
+                      <p:stCondLst>
+                        <p:cond delay="indefinite"/>
+                      </p:stCondLst>
+                      <p:childTnLst>
+                        <p:par>
+                          <p:cTn id="16" fill="hold">
+                            <p:stCondLst>
+                              <p:cond delay="0"/>
+                            </p:stCondLst>
+                            <p:childTnLst>
+                              <p:par>
+                                <p:cTn id="17" presetID="1" presetClass="entr" presetSubtype="0" fill="hold" nodeType="clickEffect">
+                                  <p:stCondLst>
+                                    <p:cond delay="0"/>
+                                  </p:stCondLst>
+                                  <p:childTnLst>
+                                    <p:set>
+                                      <p:cBhvr>
+                                        <p:cTn id="18" dur="1" fill="hold">
+                                          <p:stCondLst>
+                                            <p:cond delay="0"/>
+                                          </p:stCondLst>
+                                        </p:cTn>
+                                        <p:tgtEl>
+                                          <p:spTgt spid="9">
+                                            <p:txEl>
+                                              <p:pRg st="5" end="5"/>
+                                            </p:txEl>
+                                          </p:spTgt>
+                                        </p:tgtEl>
+                                        <p:attrNameLst>
+                                          <p:attrName>style.visibility</p:attrName>
+                                        </p:attrNameLst>
+                                      </p:cBhvr>
+                                      <p:to>
+                                        <p:strVal val="visible"/>
+                                      </p:to>
+                                    </p:set>
+                                  </p:childTnLst>
+                                </p:cTn>
+                              </p:par>
+                            </p:childTnLst>
+                          </p:cTn>
+                        </p:par>
+                      </p:childTnLst>
+                    </p:cTn>
+                  </p:par>
+                  <p:par>
+                    <p:cTn id="19" fill="hold">
+                      <p:stCondLst>
+                        <p:cond delay="indefinite"/>
+                      </p:stCondLst>
+                      <p:childTnLst>
+                        <p:par>
+                          <p:cTn id="20" fill="hold">
+                            <p:stCondLst>
+                              <p:cond delay="0"/>
+                            </p:stCondLst>
+                            <p:childTnLst>
+                              <p:par>
+                                <p:cTn id="21" presetID="1" presetClass="entr" presetSubtype="0" fill="hold" nodeType="clickEffect">
+                                  <p:stCondLst>
+                                    <p:cond delay="0"/>
+                                  </p:stCondLst>
+                                  <p:childTnLst>
+                                    <p:set>
+                                      <p:cBhvr>
+                                        <p:cTn id="22" dur="1" fill="hold">
                                           <p:stCondLst>
                                             <p:cond delay="0"/>
                                           </p:stCondLst>

</xml_diff>

<commit_message>
Updated metadata for "07. Classes and Objects"
</commit_message>
<xml_diff>
--- a/Courses/Software-Sciences/Module-1-OOP-New/07-Classes-and-Objects/07-Classes-and-Objects.pptx
+++ b/Courses/Software-Sciences/Module-1-OOP-New/07-Classes-and-Objects/07-Classes-and-Objects.pptx
@@ -347,7 +347,7 @@
           <a:p>
             <a:fld id="{4E087215-0C8F-4762-A664-737A353EC9A4}" type="datetimeFigureOut">
               <a:rPr lang="bg-BG" smtClean="0"/>
-              <a:t>21.12.22 г.</a:t>
+              <a:t>18.01.23 г.</a:t>
             </a:fld>
             <a:endParaRPr lang="bg-BG"/>
           </a:p>
@@ -538,7 +538,7 @@
           <a:p>
             <a:fld id="{72D84649-876A-46C9-8472-14CB09C070D8}" type="datetimeFigureOut">
               <a:rPr lang="en-US" smtClean="0"/>
-              <a:t>12/21/22</a:t>
+              <a:t>1/18/23</a:t>
             </a:fld>
             <a:endParaRPr lang="en-US"/>
           </a:p>

</xml_diff>

<commit_message>
Fixed animations for "07. Classes and Objects"
</commit_message>
<xml_diff>
--- a/Courses/Software-Sciences/Module-1-OOP-New/07-Classes-and-Objects/07-Classes-and-Objects.pptx
+++ b/Courses/Software-Sciences/Module-1-OOP-New/07-Classes-and-Objects/07-Classes-and-Objects.pptx
@@ -25578,7 +25578,7 @@
                             </p:stCondLst>
                             <p:childTnLst>
                               <p:par>
-                                <p:cTn id="5" presetID="1" presetClass="entr" presetSubtype="0" fill="hold" grpId="0" nodeType="clickEffect">
+                                <p:cTn id="5" presetID="1" presetClass="entr" presetSubtype="0" fill="hold" nodeType="clickEffect">
                                   <p:stCondLst>
                                     <p:cond delay="0"/>
                                   </p:stCondLst>
@@ -25591,36 +25591,9 @@
                                           </p:stCondLst>
                                         </p:cTn>
                                         <p:tgtEl>
-                                          <p:spTgt spid="14"/>
-                                        </p:tgtEl>
-                                        <p:attrNameLst>
-                                          <p:attrName>style.visibility</p:attrName>
-                                        </p:attrNameLst>
-                                      </p:cBhvr>
-                                      <p:to>
-                                        <p:strVal val="visible"/>
-                                      </p:to>
-                                    </p:set>
-                                  </p:childTnLst>
-                                </p:cTn>
-                              </p:par>
-                              <p:par>
-                                <p:cTn id="7" presetID="1" presetClass="entr" presetSubtype="0" fill="hold" nodeType="withEffect">
-                                  <p:stCondLst>
-                                    <p:cond delay="0"/>
-                                  </p:stCondLst>
-                                  <p:childTnLst>
-                                    <p:set>
-                                      <p:cBhvr>
-                                        <p:cTn id="8" dur="1" fill="hold">
-                                          <p:stCondLst>
-                                            <p:cond delay="0"/>
-                                          </p:stCondLst>
-                                        </p:cTn>
-                                        <p:tgtEl>
-                                          <p:spTgt spid="14">
+                                          <p:spTgt spid="12">
                                             <p:txEl>
-                                              <p:pRg st="0" end="0"/>
+                                              <p:pRg st="1" end="1"/>
                                             </p:txEl>
                                           </p:spTgt>
                                         </p:tgtEl>
@@ -25635,8 +25608,26 @@
                                   </p:childTnLst>
                                 </p:cTn>
                               </p:par>
+                            </p:childTnLst>
+                          </p:cTn>
+                        </p:par>
+                      </p:childTnLst>
+                    </p:cTn>
+                  </p:par>
+                  <p:par>
+                    <p:cTn id="7" fill="hold">
+                      <p:stCondLst>
+                        <p:cond delay="indefinite"/>
+                      </p:stCondLst>
+                      <p:childTnLst>
+                        <p:par>
+                          <p:cTn id="8" fill="hold">
+                            <p:stCondLst>
+                              <p:cond delay="0"/>
+                            </p:stCondLst>
+                            <p:childTnLst>
                               <p:par>
-                                <p:cTn id="9" presetID="1" presetClass="entr" presetSubtype="0" fill="hold" nodeType="withEffect">
+                                <p:cTn id="9" presetID="1" presetClass="entr" presetSubtype="0" fill="hold" grpId="0" nodeType="clickEffect">
                                   <p:stCondLst>
                                     <p:cond delay="0"/>
                                   </p:stCondLst>
@@ -25649,11 +25640,7 @@
                                           </p:stCondLst>
                                         </p:cTn>
                                         <p:tgtEl>
-                                          <p:spTgt spid="14">
-                                            <p:txEl>
-                                              <p:pRg st="1" end="1"/>
-                                            </p:txEl>
-                                          </p:spTgt>
+                                          <p:spTgt spid="14"/>
                                         </p:tgtEl>
                                         <p:attrNameLst>
                                           <p:attrName>style.visibility</p:attrName>
@@ -25682,7 +25669,7 @@
                                         <p:tgtEl>
                                           <p:spTgt spid="14">
                                             <p:txEl>
-                                              <p:pRg st="8" end="8"/>
+                                              <p:pRg st="0" end="0"/>
                                             </p:txEl>
                                           </p:spTgt>
                                         </p:tgtEl>
@@ -25697,26 +25684,39 @@
                                   </p:childTnLst>
                                 </p:cTn>
                               </p:par>
-                            </p:childTnLst>
-                          </p:cTn>
-                        </p:par>
-                      </p:childTnLst>
-                    </p:cTn>
-                  </p:par>
-                  <p:par>
-                    <p:cTn id="13" fill="hold">
-                      <p:stCondLst>
-                        <p:cond delay="indefinite"/>
-                      </p:stCondLst>
-                      <p:childTnLst>
-                        <p:par>
-                          <p:cTn id="14" fill="hold">
-                            <p:stCondLst>
-                              <p:cond delay="0"/>
-                            </p:stCondLst>
-                            <p:childTnLst>
                               <p:par>
-                                <p:cTn id="15" presetID="1" presetClass="entr" presetSubtype="0" fill="hold" grpId="0" nodeType="clickEffect">
+                                <p:cTn id="13" presetID="1" presetClass="entr" presetSubtype="0" fill="hold" nodeType="withEffect">
+                                  <p:stCondLst>
+                                    <p:cond delay="0"/>
+                                  </p:stCondLst>
+                                  <p:childTnLst>
+                                    <p:set>
+                                      <p:cBhvr>
+                                        <p:cTn id="14" dur="1" fill="hold">
+                                          <p:stCondLst>
+                                            <p:cond delay="0"/>
+                                          </p:stCondLst>
+                                        </p:cTn>
+                                        <p:tgtEl>
+                                          <p:spTgt spid="14">
+                                            <p:txEl>
+                                              <p:pRg st="1" end="1"/>
+                                            </p:txEl>
+                                          </p:spTgt>
+                                        </p:tgtEl>
+                                        <p:attrNameLst>
+                                          <p:attrName>style.visibility</p:attrName>
+                                        </p:attrNameLst>
+                                      </p:cBhvr>
+                                      <p:to>
+                                        <p:strVal val="visible"/>
+                                      </p:to>
+                                    </p:set>
+                                  </p:childTnLst>
+                                </p:cTn>
+                              </p:par>
+                              <p:par>
+                                <p:cTn id="15" presetID="1" presetClass="entr" presetSubtype="0" fill="hold" nodeType="withEffect">
                                   <p:stCondLst>
                                     <p:cond delay="0"/>
                                   </p:stCondLst>
@@ -25729,7 +25729,11 @@
                                           </p:stCondLst>
                                         </p:cTn>
                                         <p:tgtEl>
-                                          <p:spTgt spid="17"/>
+                                          <p:spTgt spid="14">
+                                            <p:txEl>
+                                              <p:pRg st="8" end="8"/>
+                                            </p:txEl>
+                                          </p:spTgt>
                                         </p:tgtEl>
                                         <p:attrNameLst>
                                           <p:attrName>style.visibility</p:attrName>
@@ -25761,7 +25765,7 @@
                             </p:stCondLst>
                             <p:childTnLst>
                               <p:par>
-                                <p:cTn id="19" presetID="1" presetClass="entr" presetSubtype="0" fill="hold" nodeType="clickEffect">
+                                <p:cTn id="19" presetID="1" presetClass="entr" presetSubtype="0" fill="hold" grpId="0" nodeType="clickEffect">
                                   <p:stCondLst>
                                     <p:cond delay="0"/>
                                   </p:stCondLst>
@@ -25774,11 +25778,7 @@
                                           </p:stCondLst>
                                         </p:cTn>
                                         <p:tgtEl>
-                                          <p:spTgt spid="14">
-                                            <p:txEl>
-                                              <p:pRg st="2" end="2"/>
-                                            </p:txEl>
-                                          </p:spTgt>
+                                          <p:spTgt spid="17"/>
                                         </p:tgtEl>
                                         <p:attrNameLst>
                                           <p:attrName>style.visibility</p:attrName>
@@ -25825,7 +25825,7 @@
                                         <p:tgtEl>
                                           <p:spTgt spid="14">
                                             <p:txEl>
-                                              <p:pRg st="3" end="3"/>
+                                              <p:pRg st="2" end="2"/>
                                             </p:txEl>
                                           </p:spTgt>
                                         </p:tgtEl>
@@ -25874,7 +25874,7 @@
                                         <p:tgtEl>
                                           <p:spTgt spid="14">
                                             <p:txEl>
-                                              <p:pRg st="4" end="4"/>
+                                              <p:pRg st="3" end="3"/>
                                             </p:txEl>
                                           </p:spTgt>
                                         </p:tgtEl>
@@ -25923,7 +25923,7 @@
                                         <p:tgtEl>
                                           <p:spTgt spid="14">
                                             <p:txEl>
-                                              <p:pRg st="5" end="5"/>
+                                              <p:pRg st="4" end="4"/>
                                             </p:txEl>
                                           </p:spTgt>
                                         </p:tgtEl>
@@ -25972,7 +25972,7 @@
                                         <p:tgtEl>
                                           <p:spTgt spid="14">
                                             <p:txEl>
-                                              <p:pRg st="6" end="6"/>
+                                              <p:pRg st="5" end="5"/>
                                             </p:txEl>
                                           </p:spTgt>
                                         </p:tgtEl>
@@ -26021,7 +26021,7 @@
                                         <p:tgtEl>
                                           <p:spTgt spid="14">
                                             <p:txEl>
-                                              <p:pRg st="7" end="7"/>
+                                              <p:pRg st="6" end="6"/>
                                             </p:txEl>
                                           </p:spTgt>
                                         </p:tgtEl>
@@ -26055,7 +26055,7 @@
                             </p:stCondLst>
                             <p:childTnLst>
                               <p:par>
-                                <p:cTn id="43" presetID="1" presetClass="entr" presetSubtype="0" fill="hold" grpId="0" nodeType="clickEffect">
+                                <p:cTn id="43" presetID="1" presetClass="entr" presetSubtype="0" fill="hold" nodeType="clickEffect">
                                   <p:stCondLst>
                                     <p:cond delay="0"/>
                                   </p:stCondLst>
@@ -26068,7 +26068,11 @@
                                           </p:stCondLst>
                                         </p:cTn>
                                         <p:tgtEl>
-                                          <p:spTgt spid="19"/>
+                                          <p:spTgt spid="14">
+                                            <p:txEl>
+                                              <p:pRg st="7" end="7"/>
+                                            </p:txEl>
+                                          </p:spTgt>
                                         </p:tgtEl>
                                         <p:attrNameLst>
                                           <p:attrName>style.visibility</p:attrName>
@@ -26113,7 +26117,7 @@
                                           </p:stCondLst>
                                         </p:cTn>
                                         <p:tgtEl>
-                                          <p:spTgt spid="15"/>
+                                          <p:spTgt spid="19"/>
                                         </p:tgtEl>
                                         <p:attrNameLst>
                                           <p:attrName>style.visibility</p:attrName>
@@ -26145,7 +26149,7 @@
                             </p:stCondLst>
                             <p:childTnLst>
                               <p:par>
-                                <p:cTn id="51" presetID="1" presetClass="entr" presetSubtype="0" fill="hold" nodeType="clickEffect">
+                                <p:cTn id="51" presetID="1" presetClass="entr" presetSubtype="0" fill="hold" grpId="0" nodeType="clickEffect">
                                   <p:stCondLst>
                                     <p:cond delay="0"/>
                                   </p:stCondLst>
@@ -26158,11 +26162,7 @@
                                           </p:stCondLst>
                                         </p:cTn>
                                         <p:tgtEl>
-                                          <p:spTgt spid="12">
-                                            <p:txEl>
-                                              <p:pRg st="1" end="1"/>
-                                            </p:txEl>
-                                          </p:spTgt>
+                                          <p:spTgt spid="15"/>
                                         </p:tgtEl>
                                         <p:attrNameLst>
                                           <p:attrName>style.visibility</p:attrName>
@@ -31306,7 +31306,7 @@
         <p:spPr>
           <a:xfrm>
             <a:off x="1296650" y="1329379"/>
-            <a:ext cx="9598700" cy="5192670"/>
+            <a:ext cx="9598700" cy="5192684"/>
           </a:xfrm>
           <a:prstGeom prst="rect">
             <a:avLst/>
@@ -31458,7 +31458,7 @@
               </a:spcAft>
             </a:pPr>
             <a:r>
-              <a:rPr lang="en-GB" sz="2399" i="1">
+              <a:rPr lang="en-GB" sz="2399" i="1" dirty="0">
                 <a:solidFill>
                   <a:schemeClr val="accent2"/>
                 </a:solidFill>
@@ -31466,7 +31466,7 @@
               <a:t>// </a:t>
             </a:r>
             <a:r>
-              <a:rPr lang="en-GB" sz="2399">
+              <a:rPr lang="en-GB" sz="2399" dirty="0">
                 <a:solidFill>
                   <a:schemeClr val="accent2"/>
                 </a:solidFill>
@@ -31474,13 +31474,30 @@
               <a:t>TODO:</a:t>
             </a:r>
             <a:r>
-              <a:rPr lang="en-GB" sz="2399" i="1">
+              <a:rPr lang="en-GB" sz="2399" i="1" dirty="0">
                 <a:solidFill>
                   <a:schemeClr val="accent2"/>
                 </a:solidFill>
               </a:rPr>
-              <a:t> Get the other fields from previous problem</a:t>
-            </a:r>
+              <a:t> </a:t>
+            </a:r>
+            <a:r>
+              <a:rPr lang="bg-BG" sz="2399" i="1" dirty="0">
+                <a:solidFill>
+                  <a:schemeClr val="accent2"/>
+                </a:solidFill>
+                <a:latin typeface="Calibri" panose="020F0502020204030204" pitchFamily="34" charset="0"/>
+                <a:cs typeface="Calibri" panose="020F0502020204030204" pitchFamily="34" charset="0"/>
+              </a:rPr>
+              <a:t>Вземете останалите полета от предишната задача</a:t>
+            </a:r>
+            <a:endParaRPr lang="en-GB" sz="2399" i="1" dirty="0">
+              <a:solidFill>
+                <a:schemeClr val="accent2"/>
+              </a:solidFill>
+              <a:latin typeface="Calibri" panose="020F0502020204030204" pitchFamily="34" charset="0"/>
+              <a:cs typeface="Calibri" panose="020F0502020204030204" pitchFamily="34" charset="0"/>
+            </a:endParaRPr>
           </a:p>
           <a:p>
             <a:pPr>
@@ -31495,7 +31512,7 @@
               </a:spcAft>
             </a:pPr>
             <a:r>
-              <a:rPr lang="en-GB" sz="2399">
+              <a:rPr lang="en-GB" sz="2399" dirty="0">
                 <a:solidFill>
                   <a:schemeClr val="tx1"/>
                 </a:solidFill>
@@ -31503,7 +31520,7 @@
               <a:t>private </a:t>
             </a:r>
             <a:r>
-              <a:rPr lang="en-GB" sz="2399">
+              <a:rPr lang="en-GB" sz="2399" dirty="0">
                 <a:solidFill>
                   <a:schemeClr val="bg1"/>
                 </a:solidFill>
@@ -31511,7 +31528,7 @@
               <a:t>double</a:t>
             </a:r>
             <a:r>
-              <a:rPr lang="en-GB" sz="2399">
+              <a:rPr lang="en-GB" sz="2399" dirty="0">
                 <a:solidFill>
                   <a:schemeClr val="tx1"/>
                 </a:solidFill>
@@ -31534,7 +31551,7 @@
               </a:rPr>
               <a:t>;</a:t>
             </a:r>
-            <a:endParaRPr lang="en-GB" sz="2399">
+            <a:endParaRPr lang="en-GB" sz="2399" dirty="0">
               <a:solidFill>
                 <a:schemeClr val="tx1"/>
               </a:solidFill>
@@ -31553,7 +31570,7 @@
               </a:spcAft>
             </a:pPr>
             <a:r>
-              <a:rPr lang="en-GB" sz="2399">
+              <a:rPr lang="en-GB" sz="2399" dirty="0">
                 <a:solidFill>
                   <a:schemeClr val="tx1"/>
                 </a:solidFill>
@@ -31561,7 +31578,7 @@
               <a:t>private </a:t>
             </a:r>
             <a:r>
-              <a:rPr lang="en-GB" sz="2399">
+              <a:rPr lang="en-GB" sz="2399" dirty="0">
                 <a:solidFill>
                   <a:schemeClr val="bg1"/>
                 </a:solidFill>
@@ -31577,7 +31594,7 @@
               <a:t>fuelConsumption</a:t>
             </a:r>
             <a:r>
-              <a:rPr lang="en-GB" sz="2399">
+              <a:rPr lang="en-GB" sz="2399" dirty="0">
                 <a:solidFill>
                   <a:schemeClr val="tx1"/>
                 </a:solidFill>
@@ -31598,7 +31615,7 @@
               </a:spcAft>
             </a:pPr>
             <a:r>
-              <a:rPr lang="en-GB" sz="2399" i="1">
+              <a:rPr lang="en-GB" sz="2399" i="1" dirty="0">
                 <a:solidFill>
                   <a:schemeClr val="accent2"/>
                 </a:solidFill>
@@ -31606,7 +31623,7 @@
               <a:t>// </a:t>
             </a:r>
             <a:r>
-              <a:rPr lang="en-GB" sz="2399">
+              <a:rPr lang="en-GB" sz="2399" dirty="0">
                 <a:solidFill>
                   <a:schemeClr val="accent2"/>
                 </a:solidFill>
@@ -31614,13 +31631,30 @@
               <a:t>TODO:</a:t>
             </a:r>
             <a:r>
-              <a:rPr lang="en-GB" sz="2399" i="1">
+              <a:rPr lang="en-GB" sz="2399" i="1" dirty="0">
                 <a:solidFill>
                   <a:schemeClr val="accent2"/>
                 </a:solidFill>
               </a:rPr>
-              <a:t> Get the other properties from previous problem</a:t>
-            </a:r>
+              <a:t> </a:t>
+            </a:r>
+            <a:r>
+              <a:rPr lang="bg-BG" sz="2399" i="1" dirty="0">
+                <a:solidFill>
+                  <a:schemeClr val="accent2"/>
+                </a:solidFill>
+                <a:latin typeface="Calibri" panose="020F0502020204030204" pitchFamily="34" charset="0"/>
+                <a:cs typeface="Calibri" panose="020F0502020204030204" pitchFamily="34" charset="0"/>
+              </a:rPr>
+              <a:t>Вземете останалите свойства от предишната задача</a:t>
+            </a:r>
+            <a:endParaRPr lang="en-GB" sz="2399" i="1" dirty="0">
+              <a:solidFill>
+                <a:schemeClr val="accent2"/>
+              </a:solidFill>
+              <a:latin typeface="Calibri" panose="020F0502020204030204" pitchFamily="34" charset="0"/>
+              <a:cs typeface="Calibri" panose="020F0502020204030204" pitchFamily="34" charset="0"/>
+            </a:endParaRPr>
           </a:p>
           <a:p>
             <a:pPr>
@@ -31629,7 +31663,7 @@
               </a:lnSpc>
             </a:pPr>
             <a:r>
-              <a:rPr lang="en-GB" sz="2399">
+              <a:rPr lang="en-GB" sz="2399" dirty="0">
                 <a:solidFill>
                   <a:schemeClr val="tx1"/>
                 </a:solidFill>
@@ -31637,7 +31671,7 @@
               <a:t>public </a:t>
             </a:r>
             <a:r>
-              <a:rPr lang="en-GB" sz="2399">
+              <a:rPr lang="en-GB" sz="2399" dirty="0">
                 <a:solidFill>
                   <a:schemeClr val="bg1"/>
                 </a:solidFill>
@@ -31653,7 +31687,7 @@
               <a:t>FuelQuantity </a:t>
             </a:r>
             <a:r>
-              <a:rPr lang="en-GB" sz="2399">
+              <a:rPr lang="en-GB" sz="2399" dirty="0">
                 <a:solidFill>
                   <a:schemeClr val="tx1"/>
                 </a:solidFill>
@@ -31668,7 +31702,7 @@
               </a:lnSpc>
             </a:pPr>
             <a:r>
-              <a:rPr lang="en-GB" sz="2399">
+              <a:rPr lang="en-GB" sz="2399" dirty="0">
                 <a:solidFill>
                   <a:schemeClr val="tx1"/>
                 </a:solidFill>
@@ -31684,7 +31718,7 @@
               <a:t>fuelQuantity</a:t>
             </a:r>
             <a:r>
-              <a:rPr lang="en-GB" sz="2399">
+              <a:rPr lang="en-GB" sz="2399" dirty="0">
                 <a:solidFill>
                   <a:schemeClr val="tx1"/>
                 </a:solidFill>
@@ -31699,7 +31733,7 @@
               </a:lnSpc>
             </a:pPr>
             <a:r>
-              <a:rPr lang="en-GB" sz="2399">
+              <a:rPr lang="en-GB" sz="2399" dirty="0">
                 <a:solidFill>
                   <a:schemeClr val="tx1"/>
                 </a:solidFill>
@@ -31715,7 +31749,7 @@
               <a:t>fuelQuantity</a:t>
             </a:r>
             <a:r>
-              <a:rPr lang="en-GB" sz="2399">
+              <a:rPr lang="en-GB" sz="2399" dirty="0">
                 <a:solidFill>
                   <a:schemeClr val="tx1"/>
                 </a:solidFill>
@@ -31730,7 +31764,7 @@
               </a:lnSpc>
             </a:pPr>
             <a:r>
-              <a:rPr lang="en-GB" sz="2399">
+              <a:rPr lang="en-GB" sz="2399" dirty="0">
                 <a:solidFill>
                   <a:schemeClr val="tx1"/>
                 </a:solidFill>
@@ -31738,7 +31772,7 @@
               <a:t>public </a:t>
             </a:r>
             <a:r>
-              <a:rPr lang="en-GB" sz="2399">
+              <a:rPr lang="en-GB" sz="2399" dirty="0">
                 <a:solidFill>
                   <a:schemeClr val="bg1"/>
                 </a:solidFill>
@@ -31754,7 +31788,7 @@
               <a:t>FuelConsumption </a:t>
             </a:r>
             <a:r>
-              <a:rPr lang="en-GB" sz="2399">
+              <a:rPr lang="en-GB" sz="2399" dirty="0">
                 <a:solidFill>
                   <a:schemeClr val="tx1"/>
                 </a:solidFill>
@@ -31769,7 +31803,7 @@
               </a:lnSpc>
             </a:pPr>
             <a:r>
-              <a:rPr lang="en-GB" sz="2399">
+              <a:rPr lang="en-GB" sz="2399" dirty="0">
                 <a:solidFill>
                   <a:schemeClr val="tx1"/>
                 </a:solidFill>
@@ -31785,7 +31819,7 @@
               <a:t>this.fuelConsumption</a:t>
             </a:r>
             <a:r>
-              <a:rPr lang="en-GB" sz="2399">
+              <a:rPr lang="en-GB" sz="2399" dirty="0">
                 <a:solidFill>
                   <a:schemeClr val="tx1"/>
                 </a:solidFill>
@@ -31800,7 +31834,7 @@
               </a:lnSpc>
             </a:pPr>
             <a:r>
-              <a:rPr lang="en-GB" sz="2399">
+              <a:rPr lang="en-GB" sz="2399" dirty="0">
                 <a:solidFill>
                   <a:schemeClr val="tx1"/>
                 </a:solidFill>
@@ -31816,7 +31850,7 @@
               <a:t>this.fuelConsumption</a:t>
             </a:r>
             <a:r>
-              <a:rPr lang="en-GB" sz="2399">
+              <a:rPr lang="en-GB" sz="2399" dirty="0">
                 <a:solidFill>
                   <a:schemeClr val="tx1"/>
                 </a:solidFill>
@@ -41683,14 +41717,32 @@
             <a:r>
               <a:rPr lang="en-US" sz="2599" b="1" noProof="1">
                 <a:solidFill>
-                  <a:schemeClr val="accent2">
-                    <a:lumMod val="75000"/>
-                  </a:schemeClr>
+                  <a:schemeClr val="accent2"/>
                 </a:solidFill>
                 <a:latin typeface="Consolas" panose="020B0609020204030204" pitchFamily="49" charset="0"/>
                 <a:cs typeface="Arial" panose="020B0604020202020204" pitchFamily="34" charset="0"/>
               </a:rPr>
-              <a:t>// Output: one; two; three; four; five; six</a:t>
+              <a:t>// И</a:t>
+            </a:r>
+            <a:r>
+              <a:rPr lang="bg-BG" sz="2599" b="1" noProof="1">
+                <a:solidFill>
+                  <a:schemeClr val="accent2"/>
+                </a:solidFill>
+                <a:latin typeface="Consolas" panose="020B0609020204030204" pitchFamily="49" charset="0"/>
+                <a:cs typeface="Arial" panose="020B0604020202020204" pitchFamily="34" charset="0"/>
+              </a:rPr>
+              <a:t>зход</a:t>
+            </a:r>
+            <a:r>
+              <a:rPr lang="en-US" sz="2599" b="1" noProof="1">
+                <a:solidFill>
+                  <a:schemeClr val="accent2"/>
+                </a:solidFill>
+                <a:latin typeface="Consolas" panose="020B0609020204030204" pitchFamily="49" charset="0"/>
+                <a:cs typeface="Arial" panose="020B0604020202020204" pitchFamily="34" charset="0"/>
+              </a:rPr>
+              <a:t>: one; two; three; four; five; six</a:t>
             </a:r>
           </a:p>
         </p:txBody>
@@ -42408,7 +42460,15 @@
                   <a:schemeClr val="accent2"/>
                 </a:solidFill>
               </a:rPr>
-              <a:t>// Create a list of rectangles</a:t>
+              <a:t>// </a:t>
+            </a:r>
+            <a:r>
+              <a:rPr lang="bg-BG" sz="2400" i="1" dirty="0">
+                <a:solidFill>
+                  <a:schemeClr val="accent2"/>
+                </a:solidFill>
+              </a:rPr>
+              <a:t>Създаване на списък с правоъгълници</a:t>
             </a:r>
             <a:endParaRPr lang="en-US" sz="2400" dirty="0">
               <a:solidFill>
@@ -42490,8 +42550,21 @@
                   <a:schemeClr val="accent2"/>
                 </a:solidFill>
               </a:rPr>
-              <a:t>// Add a few elements</a:t>
-            </a:r>
+              <a:t>// </a:t>
+            </a:r>
+            <a:r>
+              <a:rPr lang="bg-BG" sz="2400" i="1" dirty="0">
+                <a:solidFill>
+                  <a:schemeClr val="accent2"/>
+                </a:solidFill>
+              </a:rPr>
+              <a:t>Добавяне на елементи</a:t>
+            </a:r>
+            <a:endParaRPr lang="en-US" sz="2400" i="1" dirty="0">
+              <a:solidFill>
+                <a:schemeClr val="accent2"/>
+              </a:solidFill>
+            </a:endParaRPr>
           </a:p>
           <a:p>
             <a:pPr>
@@ -42672,8 +42745,21 @@
                   <a:schemeClr val="accent2"/>
                 </a:solidFill>
               </a:rPr>
-              <a:t>// Print the rectangles</a:t>
-            </a:r>
+              <a:t>// </a:t>
+            </a:r>
+            <a:r>
+              <a:rPr lang="bg-BG" sz="2400" i="1" dirty="0">
+                <a:solidFill>
+                  <a:schemeClr val="accent2"/>
+                </a:solidFill>
+              </a:rPr>
+              <a:t>Отпечатване на правоъгълниците</a:t>
+            </a:r>
+            <a:endParaRPr lang="en-US" sz="2400" i="1" dirty="0">
+              <a:solidFill>
+                <a:schemeClr val="accent2"/>
+              </a:solidFill>
+            </a:endParaRPr>
           </a:p>
           <a:p>
             <a:pPr>
@@ -42968,7 +43054,100 @@
                                         <p:tgtEl>
                                           <p:spTgt spid="9">
                                             <p:txEl>
+                                              <p:pRg st="3" end="3"/>
+                                            </p:txEl>
+                                          </p:spTgt>
+                                        </p:tgtEl>
+                                        <p:attrNameLst>
+                                          <p:attrName>style.visibility</p:attrName>
+                                        </p:attrNameLst>
+                                      </p:cBhvr>
+                                      <p:to>
+                                        <p:strVal val="visible"/>
+                                      </p:to>
+                                    </p:set>
+                                  </p:childTnLst>
+                                </p:cTn>
+                              </p:par>
+                              <p:par>
+                                <p:cTn id="7" presetID="1" presetClass="entr" presetSubtype="0" fill="hold" nodeType="withEffect">
+                                  <p:stCondLst>
+                                    <p:cond delay="0"/>
+                                  </p:stCondLst>
+                                  <p:childTnLst>
+                                    <p:set>
+                                      <p:cBhvr>
+                                        <p:cTn id="8" dur="1" fill="hold">
+                                          <p:stCondLst>
+                                            <p:cond delay="0"/>
+                                          </p:stCondLst>
+                                        </p:cTn>
+                                        <p:tgtEl>
+                                          <p:spTgt spid="9">
+                                            <p:txEl>
                                               <p:pRg st="4" end="4"/>
+                                            </p:txEl>
+                                          </p:spTgt>
+                                        </p:tgtEl>
+                                        <p:attrNameLst>
+                                          <p:attrName>style.visibility</p:attrName>
+                                        </p:attrNameLst>
+                                      </p:cBhvr>
+                                      <p:to>
+                                        <p:strVal val="visible"/>
+                                      </p:to>
+                                    </p:set>
+                                  </p:childTnLst>
+                                </p:cTn>
+                              </p:par>
+                              <p:par>
+                                <p:cTn id="9" presetID="1" presetClass="entr" presetSubtype="0" fill="hold" nodeType="withEffect">
+                                  <p:stCondLst>
+                                    <p:cond delay="0"/>
+                                  </p:stCondLst>
+                                  <p:childTnLst>
+                                    <p:set>
+                                      <p:cBhvr>
+                                        <p:cTn id="10" dur="1" fill="hold">
+                                          <p:stCondLst>
+                                            <p:cond delay="0"/>
+                                          </p:stCondLst>
+                                        </p:cTn>
+                                        <p:tgtEl>
+                                          <p:spTgt spid="9">
+                                            <p:txEl>
+                                              <p:pRg st="5" end="5"/>
+                                            </p:txEl>
+                                          </p:spTgt>
+                                        </p:tgtEl>
+                                        <p:attrNameLst>
+                                          <p:attrName>style.visibility</p:attrName>
+                                        </p:attrNameLst>
+                                      </p:cBhvr>
+                                      <p:to>
+                                        <p:strVal val="visible"/>
+                                      </p:to>
+                                    </p:set>
+                                  </p:childTnLst>
+                                </p:cTn>
+                              </p:par>
+                              <p:par>
+                                <p:cTn id="11" presetID="1" presetClass="entr" presetSubtype="0" fill="hold" nodeType="withEffect">
+                                  <p:stCondLst>
+                                    <p:cond delay="0"/>
+                                  </p:stCondLst>
+                                  <p:childTnLst>
+                                    <p:set>
+                                      <p:cBhvr>
+                                        <p:cTn id="12" dur="1" fill="hold">
+                                          <p:stCondLst>
+                                            <p:cond delay="0"/>
+                                          </p:stCondLst>
+                                        </p:cTn>
+                                        <p:tgtEl>
+                                          <p:spTgt spid="9">
+                                            <p:txEl>
+                                              <p:pRg st="6" end="6"/>
                                             </p:txEl>
                                           </p:spTgt>
                                         </p:tgtEl>
@@ -42990,26 +43169,57 @@
                     </p:cTn>
                   </p:par>
                   <p:par>
-                    <p:cTn id="7" fill="hold">
+                    <p:cTn id="13" fill="hold">
                       <p:stCondLst>
                         <p:cond delay="indefinite"/>
                       </p:stCondLst>
                       <p:childTnLst>
                         <p:par>
-                          <p:cTn id="8" fill="hold">
+                          <p:cTn id="14" fill="hold">
                             <p:stCondLst>
                               <p:cond delay="0"/>
                             </p:stCondLst>
                             <p:childTnLst>
                               <p:par>
-                                <p:cTn id="9" presetID="1" presetClass="entr" presetSubtype="0" fill="hold" nodeType="clickEffect">
+                                <p:cTn id="15" presetID="1" presetClass="entr" presetSubtype="0" fill="hold" nodeType="clickEffect">
                                   <p:stCondLst>
                                     <p:cond delay="0"/>
                                   </p:stCondLst>
                                   <p:childTnLst>
                                     <p:set>
                                       <p:cBhvr>
-                                        <p:cTn id="10" dur="1" fill="hold">
+                                        <p:cTn id="16" dur="1" fill="hold">
+                                          <p:stCondLst>
+                                            <p:cond delay="0"/>
+                                          </p:stCondLst>
+                                        </p:cTn>
+                                        <p:tgtEl>
+                                          <p:spTgt spid="9">
+                                            <p:txEl>
+                                              <p:pRg st="7" end="7"/>
+                                            </p:txEl>
+                                          </p:spTgt>
+                                        </p:tgtEl>
+                                        <p:attrNameLst>
+                                          <p:attrName>style.visibility</p:attrName>
+                                        </p:attrNameLst>
+                                      </p:cBhvr>
+                                      <p:to>
+                                        <p:strVal val="visible"/>
+                                      </p:to>
+                                    </p:set>
+                                  </p:childTnLst>
+                                </p:cTn>
+                              </p:par>
+                              <p:par>
+                                <p:cTn id="17" presetID="1" presetClass="entr" presetSubtype="0" fill="hold" nodeType="withEffect">
+                                  <p:stCondLst>
+                                    <p:cond delay="0"/>
+                                  </p:stCondLst>
+                                  <p:childTnLst>
+                                    <p:set>
+                                      <p:cBhvr>
+                                        <p:cTn id="18" dur="1" fill="hold">
                                           <p:stCondLst>
                                             <p:cond delay="0"/>
                                           </p:stCondLst>
@@ -43032,162 +43242,15 @@
                                   </p:childTnLst>
                                 </p:cTn>
                               </p:par>
-                            </p:childTnLst>
-                          </p:cTn>
-                        </p:par>
-                      </p:childTnLst>
-                    </p:cTn>
-                  </p:par>
-                  <p:par>
-                    <p:cTn id="11" fill="hold">
-                      <p:stCondLst>
-                        <p:cond delay="indefinite"/>
-                      </p:stCondLst>
-                      <p:childTnLst>
-                        <p:par>
-                          <p:cTn id="12" fill="hold">
-                            <p:stCondLst>
-                              <p:cond delay="0"/>
-                            </p:stCondLst>
-                            <p:childTnLst>
                               <p:par>
-                                <p:cTn id="13" presetID="1" presetClass="entr" presetSubtype="0" fill="hold" nodeType="clickEffect">
+                                <p:cTn id="19" presetID="1" presetClass="entr" presetSubtype="0" fill="hold" nodeType="withEffect">
                                   <p:stCondLst>
                                     <p:cond delay="0"/>
                                   </p:stCondLst>
                                   <p:childTnLst>
                                     <p:set>
                                       <p:cBhvr>
-                                        <p:cTn id="14" dur="1" fill="hold">
-                                          <p:stCondLst>
-                                            <p:cond delay="0"/>
-                                          </p:stCondLst>
-                                        </p:cTn>
-                                        <p:tgtEl>
-                                          <p:spTgt spid="9">
-                                            <p:txEl>
-                                              <p:pRg st="7" end="7"/>
-                                            </p:txEl>
-                                          </p:spTgt>
-                                        </p:tgtEl>
-                                        <p:attrNameLst>
-                                          <p:attrName>style.visibility</p:attrName>
-                                        </p:attrNameLst>
-                                      </p:cBhvr>
-                                      <p:to>
-                                        <p:strVal val="visible"/>
-                                      </p:to>
-                                    </p:set>
-                                  </p:childTnLst>
-                                </p:cTn>
-                              </p:par>
-                            </p:childTnLst>
-                          </p:cTn>
-                        </p:par>
-                      </p:childTnLst>
-                    </p:cTn>
-                  </p:par>
-                  <p:par>
-                    <p:cTn id="15" fill="hold">
-                      <p:stCondLst>
-                        <p:cond delay="indefinite"/>
-                      </p:stCondLst>
-                      <p:childTnLst>
-                        <p:par>
-                          <p:cTn id="16" fill="hold">
-                            <p:stCondLst>
-                              <p:cond delay="0"/>
-                            </p:stCondLst>
-                            <p:childTnLst>
-                              <p:par>
-                                <p:cTn id="17" presetID="1" presetClass="entr" presetSubtype="0" fill="hold" nodeType="clickEffect">
-                                  <p:stCondLst>
-                                    <p:cond delay="0"/>
-                                  </p:stCondLst>
-                                  <p:childTnLst>
-                                    <p:set>
-                                      <p:cBhvr>
-                                        <p:cTn id="18" dur="1" fill="hold">
-                                          <p:stCondLst>
-                                            <p:cond delay="0"/>
-                                          </p:stCondLst>
-                                        </p:cTn>
-                                        <p:tgtEl>
-                                          <p:spTgt spid="9">
-                                            <p:txEl>
-                                              <p:pRg st="5" end="5"/>
-                                            </p:txEl>
-                                          </p:spTgt>
-                                        </p:tgtEl>
-                                        <p:attrNameLst>
-                                          <p:attrName>style.visibility</p:attrName>
-                                        </p:attrNameLst>
-                                      </p:cBhvr>
-                                      <p:to>
-                                        <p:strVal val="visible"/>
-                                      </p:to>
-                                    </p:set>
-                                  </p:childTnLst>
-                                </p:cTn>
-                              </p:par>
-                            </p:childTnLst>
-                          </p:cTn>
-                        </p:par>
-                      </p:childTnLst>
-                    </p:cTn>
-                  </p:par>
-                  <p:par>
-                    <p:cTn id="19" fill="hold">
-                      <p:stCondLst>
-                        <p:cond delay="indefinite"/>
-                      </p:stCondLst>
-                      <p:childTnLst>
-                        <p:par>
-                          <p:cTn id="20" fill="hold">
-                            <p:stCondLst>
-                              <p:cond delay="0"/>
-                            </p:stCondLst>
-                            <p:childTnLst>
-                              <p:par>
-                                <p:cTn id="21" presetID="1" presetClass="entr" presetSubtype="0" fill="hold" nodeType="clickEffect">
-                                  <p:stCondLst>
-                                    <p:cond delay="0"/>
-                                  </p:stCondLst>
-                                  <p:childTnLst>
-                                    <p:set>
-                                      <p:cBhvr>
-                                        <p:cTn id="22" dur="1" fill="hold">
-                                          <p:stCondLst>
-                                            <p:cond delay="0"/>
-                                          </p:stCondLst>
-                                        </p:cTn>
-                                        <p:tgtEl>
-                                          <p:spTgt spid="9">
-                                            <p:txEl>
-                                              <p:pRg st="6" end="6"/>
-                                            </p:txEl>
-                                          </p:spTgt>
-                                        </p:tgtEl>
-                                        <p:attrNameLst>
-                                          <p:attrName>style.visibility</p:attrName>
-                                        </p:attrNameLst>
-                                      </p:cBhvr>
-                                      <p:to>
-                                        <p:strVal val="visible"/>
-                                      </p:to>
-                                    </p:set>
-                                  </p:childTnLst>
-                                </p:cTn>
-                              </p:par>
-                              <p:par>
-                                <p:cTn id="23" presetID="1" presetClass="entr" presetSubtype="0" fill="hold" nodeType="withEffect">
-                                  <p:stCondLst>
-                                    <p:cond delay="0"/>
-                                  </p:stCondLst>
-                                  <p:childTnLst>
-                                    <p:set>
-                                      <p:cBhvr>
-                                        <p:cTn id="24" dur="1" fill="hold">
+                                        <p:cTn id="20" dur="1" fill="hold">
                                           <p:stCondLst>
                                             <p:cond delay="0"/>
                                           </p:stCondLst>
@@ -43439,8 +43502,53 @@
                   <a:schemeClr val="accent2"/>
                 </a:solidFill>
               </a:rPr>
-              <a:t>// Delete / insert a few elements</a:t>
-            </a:r>
+              <a:t>// </a:t>
+            </a:r>
+            <a:r>
+              <a:rPr lang="bg-BG" sz="2400" i="1" dirty="0">
+                <a:solidFill>
+                  <a:schemeClr val="accent2"/>
+                </a:solidFill>
+              </a:rPr>
+              <a:t>Премахване</a:t>
+            </a:r>
+            <a:r>
+              <a:rPr lang="en-US" sz="2400" i="1" dirty="0">
+                <a:solidFill>
+                  <a:schemeClr val="accent2"/>
+                </a:solidFill>
+              </a:rPr>
+              <a:t> / </a:t>
+            </a:r>
+            <a:r>
+              <a:rPr lang="bg-BG" sz="2400" i="1" dirty="0">
+                <a:solidFill>
+                  <a:schemeClr val="accent2"/>
+                </a:solidFill>
+              </a:rPr>
+              <a:t>вмъкване</a:t>
+            </a:r>
+            <a:r>
+              <a:rPr lang="en-US" sz="2400" i="1" dirty="0">
+                <a:solidFill>
+                  <a:schemeClr val="accent2"/>
+                </a:solidFill>
+              </a:rPr>
+              <a:t> </a:t>
+            </a:r>
+            <a:r>
+              <a:rPr lang="bg-BG" sz="2400" i="1" dirty="0">
+                <a:solidFill>
+                  <a:schemeClr val="accent2"/>
+                </a:solidFill>
+              </a:rPr>
+              <a:t>на няколко елемента</a:t>
+            </a:r>
+            <a:endParaRPr lang="en-US" sz="2400" i="1" dirty="0">
+              <a:solidFill>
+                <a:schemeClr val="accent2"/>
+              </a:solidFill>
+            </a:endParaRPr>
           </a:p>
           <a:p>
             <a:pPr>
@@ -43580,8 +43688,21 @@
                   <a:schemeClr val="accent2"/>
                 </a:solidFill>
               </a:rPr>
-              <a:t>// Print the rectangles</a:t>
-            </a:r>
+              <a:t>// </a:t>
+            </a:r>
+            <a:r>
+              <a:rPr lang="bg-BG" sz="2400" i="1" dirty="0">
+                <a:solidFill>
+                  <a:schemeClr val="accent2"/>
+                </a:solidFill>
+              </a:rPr>
+              <a:t>Отпечатване на правоъгълниците</a:t>
+            </a:r>
+            <a:endParaRPr lang="en-US" sz="2400" i="1" dirty="0">
+              <a:solidFill>
+                <a:schemeClr val="accent2"/>
+              </a:solidFill>
+            </a:endParaRPr>
           </a:p>
           <a:p>
             <a:pPr>
@@ -46622,8 +46743,28 @@
               </a:spcAft>
             </a:pPr>
             <a:r>
-              <a:rPr lang="en-US" sz="2600" noProof="1"/>
-              <a:t>// Print the list …</a:t>
+              <a:rPr lang="en-US" sz="2600" noProof="1">
+                <a:solidFill>
+                  <a:schemeClr val="accent2"/>
+                </a:solidFill>
+              </a:rPr>
+              <a:t>// TODO: </a:t>
+            </a:r>
+            <a:r>
+              <a:rPr lang="bg-BG" sz="2600" noProof="1">
+                <a:solidFill>
+                  <a:schemeClr val="accent2"/>
+                </a:solidFill>
+              </a:rPr>
+              <a:t>Отпечатайте списъка</a:t>
+            </a:r>
+            <a:r>
+              <a:rPr lang="en-US" sz="2600" noProof="1">
+                <a:solidFill>
+                  <a:schemeClr val="accent2"/>
+                </a:solidFill>
+              </a:rPr>
+              <a:t>…</a:t>
             </a:r>
           </a:p>
         </p:txBody>

</xml_diff>